<commit_message>
Updates to system architecture document.
</commit_message>
<xml_diff>
--- a/Documents/Phase 2/Phase 2 Presentation.pptx
+++ b/Documents/Phase 2/Phase 2 Presentation.pptx
@@ -221,7 +221,7 @@
           <a:p>
             <a:fld id="{614165B0-7FBB-481C-B71C-1F871BDC1D5D}" type="datetimeFigureOut">
               <a:rPr lang="en-US" smtClean="0"/>
-              <a:t>10/17/2016</a:t>
+              <a:t>10/18/2016</a:t>
             </a:fld>
             <a:endParaRPr lang="en-US"/>
           </a:p>
@@ -532,144 +532,7 @@
           <a:bodyPr/>
           <a:lstStyle/>
           <a:p>
-            <a:r>
-              <a:rPr lang="en-US" dirty="0"/>
-              <a:t>Management:</a:t>
-            </a:r>
-          </a:p>
-          <a:p>
-            <a:r>
-              <a:rPr lang="en-US" dirty="0"/>
-              <a:t>	You</a:t>
-            </a:r>
-            <a:r>
-              <a:rPr lang="en-US" baseline="0" dirty="0"/>
-              <a:t> all are the Supervisory Committee with Dr. </a:t>
-            </a:r>
-            <a:r>
-              <a:rPr lang="en-US" baseline="0" dirty="0" err="1"/>
-              <a:t>Neilsen</a:t>
-            </a:r>
-            <a:r>
-              <a:rPr lang="en-US" baseline="0" dirty="0"/>
-              <a:t> being the Major Professor</a:t>
-            </a:r>
-          </a:p>
-          <a:p>
-            <a:endParaRPr lang="en-US" baseline="0" dirty="0"/>
-          </a:p>
-          <a:p>
-            <a:r>
-              <a:rPr lang="en-US" baseline="0" dirty="0"/>
-              <a:t>	Technical Inspectors: Tracy Marshall and Keith Moyer</a:t>
-            </a:r>
-          </a:p>
-          <a:p>
-            <a:endParaRPr lang="en-US" baseline="0" dirty="0"/>
-          </a:p>
-          <a:p>
-            <a:endParaRPr lang="en-US" baseline="0" dirty="0"/>
-          </a:p>
-          <a:p>
-            <a:r>
-              <a:rPr lang="en-US" baseline="0" dirty="0"/>
-              <a:t>Software Reviews:</a:t>
-            </a:r>
-          </a:p>
-          <a:p>
-            <a:r>
-              <a:rPr lang="en-US" baseline="0" dirty="0"/>
-              <a:t>	This will come in the form of these presentations along with the technical inspections done.</a:t>
-            </a:r>
-          </a:p>
-          <a:p>
-            <a:endParaRPr lang="en-US" baseline="0" dirty="0"/>
-          </a:p>
-          <a:p>
-            <a:endParaRPr lang="en-US" baseline="0" dirty="0"/>
-          </a:p>
-          <a:p>
-            <a:r>
-              <a:rPr lang="en-US" baseline="0" dirty="0"/>
-              <a:t>Testing:</a:t>
-            </a:r>
-          </a:p>
-          <a:p>
-            <a:r>
-              <a:rPr lang="en-US" baseline="0" dirty="0"/>
-              <a:t>	A detailed test plan will be given during the second phase of the project, which will assess the critical requirements.</a:t>
-            </a:r>
-          </a:p>
-          <a:p>
-            <a:endParaRPr lang="en-US" baseline="0" dirty="0"/>
-          </a:p>
-          <a:p>
-            <a:endParaRPr lang="en-US" baseline="0" dirty="0"/>
-          </a:p>
-          <a:p>
-            <a:r>
-              <a:rPr lang="en-US" baseline="0" dirty="0"/>
-              <a:t>Problem Reporting and Corrective Action:</a:t>
-            </a:r>
-          </a:p>
-          <a:p>
-            <a:r>
-              <a:rPr lang="en-US" baseline="0" dirty="0"/>
-              <a:t>	Any issues reported by the committee or the technical inspectors will be reported and any needed corrective action will take place.  Depending on the issue type, it can be noted and documented through the documentation in latter phases or through the GitHub Issue reporting system.</a:t>
-            </a:r>
-          </a:p>
-          <a:p>
-            <a:endParaRPr lang="en-US" baseline="0" dirty="0"/>
-          </a:p>
-          <a:p>
-            <a:endParaRPr lang="en-US" baseline="0" dirty="0"/>
-          </a:p>
-          <a:p>
-            <a:r>
-              <a:rPr lang="en-US" baseline="0" dirty="0"/>
-              <a:t>Tools, Techniques and Methodologies:</a:t>
-            </a:r>
-          </a:p>
-          <a:p>
-            <a:r>
-              <a:rPr lang="en-US" baseline="0" dirty="0"/>
-              <a:t>	Visual Studio IDE – Currently Python 3.5 (possibly switching to 2.7 due to TCP/IP libraries)</a:t>
-            </a:r>
-          </a:p>
-          <a:p>
-            <a:r>
-              <a:rPr lang="en-US" baseline="0" dirty="0"/>
-              <a:t>	Documentation is through Microsoft Office 365 Suite of tools</a:t>
-            </a:r>
-          </a:p>
-          <a:p>
-            <a:r>
-              <a:rPr lang="en-US" baseline="0" dirty="0"/>
-              <a:t>	UML Diagrams through Visual Paradigm</a:t>
-            </a:r>
-          </a:p>
-          <a:p>
-            <a:endParaRPr lang="en-US" baseline="0" dirty="0"/>
-          </a:p>
-          <a:p>
-            <a:r>
-              <a:rPr lang="en-US" baseline="0" dirty="0"/>
-              <a:t>Revision Control:</a:t>
-            </a:r>
-          </a:p>
-          <a:p>
-            <a:r>
-              <a:rPr lang="en-US" baseline="0" dirty="0"/>
-              <a:t>	</a:t>
-            </a:r>
-            <a:r>
-              <a:rPr lang="en-US" baseline="0" dirty="0" err="1"/>
-              <a:t>Git</a:t>
-            </a:r>
-            <a:r>
-              <a:rPr lang="en-US" baseline="0" dirty="0"/>
-              <a:t> via GitHub</a:t>
-            </a:r>
+            <a:endParaRPr lang="en-US"/>
           </a:p>
         </p:txBody>
       </p:sp>
@@ -690,7 +553,7 @@
           <a:p>
             <a:fld id="{235139D7-2FFB-477F-8573-0D4E0D9DD1FF}" type="slidenum">
               <a:rPr lang="en-US" smtClean="0"/>
-              <a:t>17</a:t>
+              <a:t>7</a:t>
             </a:fld>
             <a:endParaRPr lang="en-US"/>
           </a:p>
@@ -699,7 +562,7 @@
     </p:spTree>
     <p:extLst>
       <p:ext uri="{BB962C8B-B14F-4D97-AF65-F5344CB8AC3E}">
-        <p14:creationId xmlns:p14="http://schemas.microsoft.com/office/powerpoint/2010/main" val="3930529485"/>
+        <p14:creationId xmlns:p14="http://schemas.microsoft.com/office/powerpoint/2010/main" val="4054434913"/>
       </p:ext>
     </p:extLst>
   </p:cSld>
@@ -911,7 +774,7 @@
           <a:p>
             <a:fld id="{235139D7-2FFB-477F-8573-0D4E0D9DD1FF}" type="slidenum">
               <a:rPr lang="en-US" smtClean="0"/>
-              <a:t>18</a:t>
+              <a:t>17</a:t>
             </a:fld>
             <a:endParaRPr lang="en-US"/>
           </a:p>
@@ -920,7 +783,7 @@
     </p:spTree>
     <p:extLst>
       <p:ext uri="{BB962C8B-B14F-4D97-AF65-F5344CB8AC3E}">
-        <p14:creationId xmlns:p14="http://schemas.microsoft.com/office/powerpoint/2010/main" val="4202201145"/>
+        <p14:creationId xmlns:p14="http://schemas.microsoft.com/office/powerpoint/2010/main" val="3930529485"/>
       </p:ext>
     </p:extLst>
   </p:cSld>
@@ -1132,7 +995,7 @@
           <a:p>
             <a:fld id="{235139D7-2FFB-477F-8573-0D4E0D9DD1FF}" type="slidenum">
               <a:rPr lang="en-US" smtClean="0"/>
-              <a:t>19</a:t>
+              <a:t>18</a:t>
             </a:fld>
             <a:endParaRPr lang="en-US"/>
           </a:p>
@@ -1141,7 +1004,7 @@
     </p:spTree>
     <p:extLst>
       <p:ext uri="{BB962C8B-B14F-4D97-AF65-F5344CB8AC3E}">
-        <p14:creationId xmlns:p14="http://schemas.microsoft.com/office/powerpoint/2010/main" val="815450405"/>
+        <p14:creationId xmlns:p14="http://schemas.microsoft.com/office/powerpoint/2010/main" val="4202201145"/>
       </p:ext>
     </p:extLst>
   </p:cSld>
@@ -1353,6 +1216,227 @@
           <a:p>
             <a:fld id="{235139D7-2FFB-477F-8573-0D4E0D9DD1FF}" type="slidenum">
               <a:rPr lang="en-US" smtClean="0"/>
+              <a:t>19</a:t>
+            </a:fld>
+            <a:endParaRPr lang="en-US"/>
+          </a:p>
+        </p:txBody>
+      </p:sp>
+    </p:spTree>
+    <p:extLst>
+      <p:ext uri="{BB962C8B-B14F-4D97-AF65-F5344CB8AC3E}">
+        <p14:creationId xmlns:p14="http://schemas.microsoft.com/office/powerpoint/2010/main" val="815450405"/>
+      </p:ext>
+    </p:extLst>
+  </p:cSld>
+  <p:clrMapOvr>
+    <a:masterClrMapping/>
+  </p:clrMapOvr>
+</p:notes>
+</file>
+
+<file path=ppt/notesSlides/notesSlide5.xml><?xml version="1.0" encoding="utf-8"?>
+<p:notes xmlns:a="http://schemas.openxmlformats.org/drawingml/2006/main" xmlns:r="http://schemas.openxmlformats.org/officeDocument/2006/relationships" xmlns:p="http://schemas.openxmlformats.org/presentationml/2006/main">
+  <p:cSld>
+    <p:spTree>
+      <p:nvGrpSpPr>
+        <p:cNvPr id="1" name=""/>
+        <p:cNvGrpSpPr/>
+        <p:nvPr/>
+      </p:nvGrpSpPr>
+      <p:grpSpPr>
+        <a:xfrm>
+          <a:off x="0" y="0"/>
+          <a:ext cx="0" cy="0"/>
+          <a:chOff x="0" y="0"/>
+          <a:chExt cx="0" cy="0"/>
+        </a:xfrm>
+      </p:grpSpPr>
+      <p:sp>
+        <p:nvSpPr>
+          <p:cNvPr id="2" name="Slide Image Placeholder 1"/>
+          <p:cNvSpPr>
+            <a:spLocks noGrp="1" noRot="1" noChangeAspect="1"/>
+          </p:cNvSpPr>
+          <p:nvPr>
+            <p:ph type="sldImg"/>
+          </p:nvPr>
+        </p:nvSpPr>
+        <p:spPr/>
+      </p:sp>
+      <p:sp>
+        <p:nvSpPr>
+          <p:cNvPr id="3" name="Notes Placeholder 2"/>
+          <p:cNvSpPr>
+            <a:spLocks noGrp="1"/>
+          </p:cNvSpPr>
+          <p:nvPr>
+            <p:ph type="body" idx="1"/>
+          </p:nvPr>
+        </p:nvSpPr>
+        <p:spPr/>
+        <p:txBody>
+          <a:bodyPr/>
+          <a:lstStyle/>
+          <a:p>
+            <a:r>
+              <a:rPr lang="en-US" dirty="0"/>
+              <a:t>Management:</a:t>
+            </a:r>
+          </a:p>
+          <a:p>
+            <a:r>
+              <a:rPr lang="en-US" dirty="0"/>
+              <a:t>	You</a:t>
+            </a:r>
+            <a:r>
+              <a:rPr lang="en-US" baseline="0" dirty="0"/>
+              <a:t> all are the Supervisory Committee with Dr. </a:t>
+            </a:r>
+            <a:r>
+              <a:rPr lang="en-US" baseline="0" dirty="0" err="1"/>
+              <a:t>Neilsen</a:t>
+            </a:r>
+            <a:r>
+              <a:rPr lang="en-US" baseline="0" dirty="0"/>
+              <a:t> being the Major Professor</a:t>
+            </a:r>
+          </a:p>
+          <a:p>
+            <a:endParaRPr lang="en-US" baseline="0" dirty="0"/>
+          </a:p>
+          <a:p>
+            <a:r>
+              <a:rPr lang="en-US" baseline="0" dirty="0"/>
+              <a:t>	Technical Inspectors: Tracy Marshall and Keith Moyer</a:t>
+            </a:r>
+          </a:p>
+          <a:p>
+            <a:endParaRPr lang="en-US" baseline="0" dirty="0"/>
+          </a:p>
+          <a:p>
+            <a:endParaRPr lang="en-US" baseline="0" dirty="0"/>
+          </a:p>
+          <a:p>
+            <a:r>
+              <a:rPr lang="en-US" baseline="0" dirty="0"/>
+              <a:t>Software Reviews:</a:t>
+            </a:r>
+          </a:p>
+          <a:p>
+            <a:r>
+              <a:rPr lang="en-US" baseline="0" dirty="0"/>
+              <a:t>	This will come in the form of these presentations along with the technical inspections done.</a:t>
+            </a:r>
+          </a:p>
+          <a:p>
+            <a:endParaRPr lang="en-US" baseline="0" dirty="0"/>
+          </a:p>
+          <a:p>
+            <a:endParaRPr lang="en-US" baseline="0" dirty="0"/>
+          </a:p>
+          <a:p>
+            <a:r>
+              <a:rPr lang="en-US" baseline="0" dirty="0"/>
+              <a:t>Testing:</a:t>
+            </a:r>
+          </a:p>
+          <a:p>
+            <a:r>
+              <a:rPr lang="en-US" baseline="0" dirty="0"/>
+              <a:t>	A detailed test plan will be given during the second phase of the project, which will assess the critical requirements.</a:t>
+            </a:r>
+          </a:p>
+          <a:p>
+            <a:endParaRPr lang="en-US" baseline="0" dirty="0"/>
+          </a:p>
+          <a:p>
+            <a:endParaRPr lang="en-US" baseline="0" dirty="0"/>
+          </a:p>
+          <a:p>
+            <a:r>
+              <a:rPr lang="en-US" baseline="0" dirty="0"/>
+              <a:t>Problem Reporting and Corrective Action:</a:t>
+            </a:r>
+          </a:p>
+          <a:p>
+            <a:r>
+              <a:rPr lang="en-US" baseline="0" dirty="0"/>
+              <a:t>	Any issues reported by the committee or the technical inspectors will be reported and any needed corrective action will take place.  Depending on the issue type, it can be noted and documented through the documentation in latter phases or through the GitHub Issue reporting system.</a:t>
+            </a:r>
+          </a:p>
+          <a:p>
+            <a:endParaRPr lang="en-US" baseline="0" dirty="0"/>
+          </a:p>
+          <a:p>
+            <a:endParaRPr lang="en-US" baseline="0" dirty="0"/>
+          </a:p>
+          <a:p>
+            <a:r>
+              <a:rPr lang="en-US" baseline="0" dirty="0"/>
+              <a:t>Tools, Techniques and Methodologies:</a:t>
+            </a:r>
+          </a:p>
+          <a:p>
+            <a:r>
+              <a:rPr lang="en-US" baseline="0" dirty="0"/>
+              <a:t>	Visual Studio IDE – Currently Python 3.5 (possibly switching to 2.7 due to TCP/IP libraries)</a:t>
+            </a:r>
+          </a:p>
+          <a:p>
+            <a:r>
+              <a:rPr lang="en-US" baseline="0" dirty="0"/>
+              <a:t>	Documentation is through Microsoft Office 365 Suite of tools</a:t>
+            </a:r>
+          </a:p>
+          <a:p>
+            <a:r>
+              <a:rPr lang="en-US" baseline="0" dirty="0"/>
+              <a:t>	UML Diagrams through Visual Paradigm</a:t>
+            </a:r>
+          </a:p>
+          <a:p>
+            <a:endParaRPr lang="en-US" baseline="0" dirty="0"/>
+          </a:p>
+          <a:p>
+            <a:r>
+              <a:rPr lang="en-US" baseline="0" dirty="0"/>
+              <a:t>Revision Control:</a:t>
+            </a:r>
+          </a:p>
+          <a:p>
+            <a:r>
+              <a:rPr lang="en-US" baseline="0" dirty="0"/>
+              <a:t>	</a:t>
+            </a:r>
+            <a:r>
+              <a:rPr lang="en-US" baseline="0" dirty="0" err="1"/>
+              <a:t>Git</a:t>
+            </a:r>
+            <a:r>
+              <a:rPr lang="en-US" baseline="0" dirty="0"/>
+              <a:t> via GitHub</a:t>
+            </a:r>
+          </a:p>
+        </p:txBody>
+      </p:sp>
+      <p:sp>
+        <p:nvSpPr>
+          <p:cNvPr id="4" name="Slide Number Placeholder 3"/>
+          <p:cNvSpPr>
+            <a:spLocks noGrp="1"/>
+          </p:cNvSpPr>
+          <p:nvPr>
+            <p:ph type="sldNum" sz="quarter" idx="10"/>
+          </p:nvPr>
+        </p:nvSpPr>
+        <p:spPr/>
+        <p:txBody>
+          <a:bodyPr/>
+          <a:lstStyle/>
+          <a:p>
+            <a:fld id="{235139D7-2FFB-477F-8573-0D4E0D9DD1FF}" type="slidenum">
+              <a:rPr lang="en-US" smtClean="0"/>
               <a:t>20</a:t>
             </a:fld>
             <a:endParaRPr lang="en-US"/>
@@ -1372,7 +1456,7 @@
 </p:notes>
 </file>
 
-<file path=ppt/notesSlides/notesSlide5.xml><?xml version="1.0" encoding="utf-8"?>
+<file path=ppt/notesSlides/notesSlide6.xml><?xml version="1.0" encoding="utf-8"?>
 <p:notes xmlns:a="http://schemas.openxmlformats.org/drawingml/2006/main" xmlns:r="http://schemas.openxmlformats.org/officeDocument/2006/relationships" xmlns:p="http://schemas.openxmlformats.org/presentationml/2006/main">
   <p:cSld>
     <p:spTree>
@@ -1650,7 +1734,7 @@
           <a:noFill/>
           <a:extLst>
             <a:ext uri="{909E8E84-426E-40dd-AFC4-6F175D3DCCD1}">
-              <a14:hiddenFill xmlns="" xmlns:a14="http://schemas.microsoft.com/office/drawing/2010/main">
+              <a14:hiddenFill xmlns:a14="http://schemas.microsoft.com/office/drawing/2010/main" xmlns="">
                 <a:solidFill>
                   <a:srgbClr val="FFFFFF"/>
                 </a:solidFill>
@@ -1709,7 +1793,7 @@
             </a:ln>
             <a:extLst>
               <a:ext uri="{91240B29-F687-4f45-9708-019B960494DF}">
-                <a14:hiddenLine xmlns="" xmlns:a14="http://schemas.microsoft.com/office/drawing/2010/main" w="9525">
+                <a14:hiddenLine xmlns:a14="http://schemas.microsoft.com/office/drawing/2010/main" xmlns="" w="9525">
                   <a:solidFill>
                     <a:srgbClr val="000000"/>
                   </a:solidFill>
@@ -1799,7 +1883,7 @@
             </a:ln>
             <a:extLst>
               <a:ext uri="{91240B29-F687-4f45-9708-019B960494DF}">
-                <a14:hiddenLine xmlns="" xmlns:a14="http://schemas.microsoft.com/office/drawing/2010/main" w="9525">
+                <a14:hiddenLine xmlns:a14="http://schemas.microsoft.com/office/drawing/2010/main" xmlns="" w="9525">
                   <a:solidFill>
                     <a:srgbClr val="000000"/>
                   </a:solidFill>
@@ -1889,7 +1973,7 @@
             </a:ln>
             <a:extLst>
               <a:ext uri="{91240B29-F687-4f45-9708-019B960494DF}">
-                <a14:hiddenLine xmlns="" xmlns:a14="http://schemas.microsoft.com/office/drawing/2010/main" w="9525">
+                <a14:hiddenLine xmlns:a14="http://schemas.microsoft.com/office/drawing/2010/main" xmlns="" w="9525">
                   <a:solidFill>
                     <a:srgbClr val="000000"/>
                   </a:solidFill>
@@ -1923,7 +2007,7 @@
             </a:ln>
             <a:extLst>
               <a:ext uri="{91240B29-F687-4f45-9708-019B960494DF}">
-                <a14:hiddenLine xmlns="" xmlns:a14="http://schemas.microsoft.com/office/drawing/2010/main" w="9525">
+                <a14:hiddenLine xmlns:a14="http://schemas.microsoft.com/office/drawing/2010/main" xmlns="" w="9525">
                   <a:solidFill>
                     <a:srgbClr val="000000"/>
                   </a:solidFill>
@@ -2013,7 +2097,7 @@
             </a:ln>
             <a:extLst>
               <a:ext uri="{91240B29-F687-4f45-9708-019B960494DF}">
-                <a14:hiddenLine xmlns="" xmlns:a14="http://schemas.microsoft.com/office/drawing/2010/main" w="9525">
+                <a14:hiddenLine xmlns:a14="http://schemas.microsoft.com/office/drawing/2010/main" xmlns="" w="9525">
                   <a:solidFill>
                     <a:srgbClr val="000000"/>
                   </a:solidFill>
@@ -2075,7 +2159,7 @@
             </a:ln>
             <a:extLst>
               <a:ext uri="{91240B29-F687-4f45-9708-019B960494DF}">
-                <a14:hiddenLine xmlns="" xmlns:a14="http://schemas.microsoft.com/office/drawing/2010/main" w="9525">
+                <a14:hiddenLine xmlns:a14="http://schemas.microsoft.com/office/drawing/2010/main" xmlns="" w="9525">
                   <a:solidFill>
                     <a:srgbClr val="000000"/>
                   </a:solidFill>
@@ -2137,7 +2221,7 @@
             </a:ln>
             <a:extLst>
               <a:ext uri="{91240B29-F687-4f45-9708-019B960494DF}">
-                <a14:hiddenLine xmlns="" xmlns:a14="http://schemas.microsoft.com/office/drawing/2010/main" w="9525">
+                <a14:hiddenLine xmlns:a14="http://schemas.microsoft.com/office/drawing/2010/main" xmlns="" w="9525">
                   <a:solidFill>
                     <a:srgbClr val="000000"/>
                   </a:solidFill>
@@ -2227,7 +2311,7 @@
             </a:ln>
             <a:extLst>
               <a:ext uri="{91240B29-F687-4f45-9708-019B960494DF}">
-                <a14:hiddenLine xmlns="" xmlns:a14="http://schemas.microsoft.com/office/drawing/2010/main" w="9525">
+                <a14:hiddenLine xmlns:a14="http://schemas.microsoft.com/office/drawing/2010/main" xmlns="" w="9525">
                   <a:solidFill>
                     <a:srgbClr val="000000"/>
                   </a:solidFill>
@@ -2289,7 +2373,7 @@
             </a:ln>
             <a:extLst>
               <a:ext uri="{91240B29-F687-4f45-9708-019B960494DF}">
-                <a14:hiddenLine xmlns="" xmlns:a14="http://schemas.microsoft.com/office/drawing/2010/main" w="9525">
+                <a14:hiddenLine xmlns:a14="http://schemas.microsoft.com/office/drawing/2010/main" xmlns="" w="9525">
                   <a:solidFill>
                     <a:srgbClr val="000000"/>
                   </a:solidFill>
@@ -2351,7 +2435,7 @@
             </a:ln>
             <a:extLst>
               <a:ext uri="{91240B29-F687-4f45-9708-019B960494DF}">
-                <a14:hiddenLine xmlns="" xmlns:a14="http://schemas.microsoft.com/office/drawing/2010/main" w="9525">
+                <a14:hiddenLine xmlns:a14="http://schemas.microsoft.com/office/drawing/2010/main" xmlns="" w="9525">
                   <a:solidFill>
                     <a:srgbClr val="000000"/>
                   </a:solidFill>
@@ -2441,7 +2525,7 @@
             </a:ln>
             <a:extLst>
               <a:ext uri="{91240B29-F687-4f45-9708-019B960494DF}">
-                <a14:hiddenLine xmlns="" xmlns:a14="http://schemas.microsoft.com/office/drawing/2010/main" w="9525">
+                <a14:hiddenLine xmlns:a14="http://schemas.microsoft.com/office/drawing/2010/main" xmlns="" w="9525">
                   <a:solidFill>
                     <a:srgbClr val="000000"/>
                   </a:solidFill>
@@ -2531,7 +2615,7 @@
             </a:ln>
             <a:extLst>
               <a:ext uri="{91240B29-F687-4f45-9708-019B960494DF}">
-                <a14:hiddenLine xmlns="" xmlns:a14="http://schemas.microsoft.com/office/drawing/2010/main" w="9525">
+                <a14:hiddenLine xmlns:a14="http://schemas.microsoft.com/office/drawing/2010/main" xmlns="" w="9525">
                   <a:solidFill>
                     <a:srgbClr val="000000"/>
                   </a:solidFill>
@@ -2593,7 +2677,7 @@
             </a:ln>
             <a:extLst>
               <a:ext uri="{91240B29-F687-4f45-9708-019B960494DF}">
-                <a14:hiddenLine xmlns="" xmlns:a14="http://schemas.microsoft.com/office/drawing/2010/main" w="9525">
+                <a14:hiddenLine xmlns:a14="http://schemas.microsoft.com/office/drawing/2010/main" xmlns="" w="9525">
                   <a:solidFill>
                     <a:srgbClr val="000000"/>
                   </a:solidFill>
@@ -2703,7 +2787,7 @@
             </a:ln>
             <a:extLst>
               <a:ext uri="{91240B29-F687-4f45-9708-019B960494DF}">
-                <a14:hiddenLine xmlns="" xmlns:a14="http://schemas.microsoft.com/office/drawing/2010/main" w="9525">
+                <a14:hiddenLine xmlns:a14="http://schemas.microsoft.com/office/drawing/2010/main" xmlns="" w="9525">
                   <a:solidFill>
                     <a:srgbClr val="000000"/>
                   </a:solidFill>
@@ -2765,7 +2849,7 @@
             </a:ln>
             <a:extLst>
               <a:ext uri="{91240B29-F687-4f45-9708-019B960494DF}">
-                <a14:hiddenLine xmlns="" xmlns:a14="http://schemas.microsoft.com/office/drawing/2010/main" w="9525">
+                <a14:hiddenLine xmlns:a14="http://schemas.microsoft.com/office/drawing/2010/main" xmlns="" w="9525">
                   <a:solidFill>
                     <a:srgbClr val="000000"/>
                   </a:solidFill>
@@ -2855,7 +2939,7 @@
             </a:ln>
             <a:extLst>
               <a:ext uri="{91240B29-F687-4f45-9708-019B960494DF}">
-                <a14:hiddenLine xmlns="" xmlns:a14="http://schemas.microsoft.com/office/drawing/2010/main" w="9525">
+                <a14:hiddenLine xmlns:a14="http://schemas.microsoft.com/office/drawing/2010/main" xmlns="" w="9525">
                   <a:solidFill>
                     <a:srgbClr val="000000"/>
                   </a:solidFill>
@@ -2945,7 +3029,7 @@
             </a:ln>
             <a:extLst>
               <a:ext uri="{91240B29-F687-4f45-9708-019B960494DF}">
-                <a14:hiddenLine xmlns="" xmlns:a14="http://schemas.microsoft.com/office/drawing/2010/main" w="9525">
+                <a14:hiddenLine xmlns:a14="http://schemas.microsoft.com/office/drawing/2010/main" xmlns="" w="9525">
                   <a:solidFill>
                     <a:srgbClr val="000000"/>
                   </a:solidFill>
@@ -3007,7 +3091,7 @@
             </a:ln>
             <a:extLst>
               <a:ext uri="{91240B29-F687-4f45-9708-019B960494DF}">
-                <a14:hiddenLine xmlns="" xmlns:a14="http://schemas.microsoft.com/office/drawing/2010/main" w="9525">
+                <a14:hiddenLine xmlns:a14="http://schemas.microsoft.com/office/drawing/2010/main" xmlns="" w="9525">
                   <a:solidFill>
                     <a:srgbClr val="000000"/>
                   </a:solidFill>
@@ -3097,7 +3181,7 @@
             </a:ln>
             <a:extLst>
               <a:ext uri="{91240B29-F687-4f45-9708-019B960494DF}">
-                <a14:hiddenLine xmlns="" xmlns:a14="http://schemas.microsoft.com/office/drawing/2010/main" w="9525">
+                <a14:hiddenLine xmlns:a14="http://schemas.microsoft.com/office/drawing/2010/main" xmlns="" w="9525">
                   <a:solidFill>
                     <a:srgbClr val="000000"/>
                   </a:solidFill>
@@ -3187,7 +3271,7 @@
             </a:ln>
             <a:extLst>
               <a:ext uri="{91240B29-F687-4f45-9708-019B960494DF}">
-                <a14:hiddenLine xmlns="" xmlns:a14="http://schemas.microsoft.com/office/drawing/2010/main" w="9525">
+                <a14:hiddenLine xmlns:a14="http://schemas.microsoft.com/office/drawing/2010/main" xmlns="" w="9525">
                   <a:solidFill>
                     <a:srgbClr val="000000"/>
                   </a:solidFill>
@@ -3243,7 +3327,7 @@
             </a:ln>
             <a:extLst>
               <a:ext uri="{91240B29-F687-4f45-9708-019B960494DF}">
-                <a14:hiddenLine xmlns="" xmlns:a14="http://schemas.microsoft.com/office/drawing/2010/main" w="9525">
+                <a14:hiddenLine xmlns:a14="http://schemas.microsoft.com/office/drawing/2010/main" xmlns="" w="9525">
                   <a:solidFill>
                     <a:srgbClr val="000000"/>
                   </a:solidFill>
@@ -3333,7 +3417,7 @@
             </a:ln>
             <a:extLst>
               <a:ext uri="{91240B29-F687-4f45-9708-019B960494DF}">
-                <a14:hiddenLine xmlns="" xmlns:a14="http://schemas.microsoft.com/office/drawing/2010/main" w="9525">
+                <a14:hiddenLine xmlns:a14="http://schemas.microsoft.com/office/drawing/2010/main" xmlns="" w="9525">
                   <a:solidFill>
                     <a:srgbClr val="000000"/>
                   </a:solidFill>
@@ -3389,7 +3473,7 @@
             </a:ln>
             <a:extLst>
               <a:ext uri="{91240B29-F687-4f45-9708-019B960494DF}">
-                <a14:hiddenLine xmlns="" xmlns:a14="http://schemas.microsoft.com/office/drawing/2010/main" w="9525">
+                <a14:hiddenLine xmlns:a14="http://schemas.microsoft.com/office/drawing/2010/main" xmlns="" w="9525">
                   <a:solidFill>
                     <a:srgbClr val="000000"/>
                   </a:solidFill>
@@ -3479,7 +3563,7 @@
             </a:ln>
             <a:extLst>
               <a:ext uri="{91240B29-F687-4f45-9708-019B960494DF}">
-                <a14:hiddenLine xmlns="" xmlns:a14="http://schemas.microsoft.com/office/drawing/2010/main" w="9525">
+                <a14:hiddenLine xmlns:a14="http://schemas.microsoft.com/office/drawing/2010/main" xmlns="" w="9525">
                   <a:solidFill>
                     <a:srgbClr val="000000"/>
                   </a:solidFill>
@@ -3547,7 +3631,7 @@
             </a:ln>
             <a:extLst>
               <a:ext uri="{91240B29-F687-4f45-9708-019B960494DF}">
-                <a14:hiddenLine xmlns="" xmlns:a14="http://schemas.microsoft.com/office/drawing/2010/main" w="9525">
+                <a14:hiddenLine xmlns:a14="http://schemas.microsoft.com/office/drawing/2010/main" xmlns="" w="9525">
                   <a:solidFill>
                     <a:srgbClr val="000000"/>
                   </a:solidFill>
@@ -3637,7 +3721,7 @@
             </a:ln>
             <a:extLst>
               <a:ext uri="{91240B29-F687-4f45-9708-019B960494DF}">
-                <a14:hiddenLine xmlns="" xmlns:a14="http://schemas.microsoft.com/office/drawing/2010/main" w="9525">
+                <a14:hiddenLine xmlns:a14="http://schemas.microsoft.com/office/drawing/2010/main" xmlns="" w="9525">
                   <a:solidFill>
                     <a:srgbClr val="000000"/>
                   </a:solidFill>
@@ -3705,7 +3789,7 @@
             </a:ln>
             <a:extLst>
               <a:ext uri="{91240B29-F687-4f45-9708-019B960494DF}">
-                <a14:hiddenLine xmlns="" xmlns:a14="http://schemas.microsoft.com/office/drawing/2010/main" w="9525">
+                <a14:hiddenLine xmlns:a14="http://schemas.microsoft.com/office/drawing/2010/main" xmlns="" w="9525">
                   <a:solidFill>
                     <a:srgbClr val="000000"/>
                   </a:solidFill>
@@ -3795,7 +3879,7 @@
             </a:ln>
             <a:extLst>
               <a:ext uri="{91240B29-F687-4f45-9708-019B960494DF}">
-                <a14:hiddenLine xmlns="" xmlns:a14="http://schemas.microsoft.com/office/drawing/2010/main" w="9525">
+                <a14:hiddenLine xmlns:a14="http://schemas.microsoft.com/office/drawing/2010/main" xmlns="" w="9525">
                   <a:solidFill>
                     <a:srgbClr val="000000"/>
                   </a:solidFill>
@@ -3829,7 +3913,7 @@
             </a:ln>
             <a:extLst>
               <a:ext uri="{91240B29-F687-4f45-9708-019B960494DF}">
-                <a14:hiddenLine xmlns="" xmlns:a14="http://schemas.microsoft.com/office/drawing/2010/main" w="9525">
+                <a14:hiddenLine xmlns:a14="http://schemas.microsoft.com/office/drawing/2010/main" xmlns="" w="9525">
                   <a:solidFill>
                     <a:srgbClr val="000000"/>
                   </a:solidFill>
@@ -3919,7 +4003,7 @@
             </a:ln>
             <a:extLst>
               <a:ext uri="{91240B29-F687-4f45-9708-019B960494DF}">
-                <a14:hiddenLine xmlns="" xmlns:a14="http://schemas.microsoft.com/office/drawing/2010/main" w="9525">
+                <a14:hiddenLine xmlns:a14="http://schemas.microsoft.com/office/drawing/2010/main" xmlns="" w="9525">
                   <a:solidFill>
                     <a:srgbClr val="000000"/>
                   </a:solidFill>
@@ -3981,7 +4065,7 @@
             </a:ln>
             <a:extLst>
               <a:ext uri="{91240B29-F687-4f45-9708-019B960494DF}">
-                <a14:hiddenLine xmlns="" xmlns:a14="http://schemas.microsoft.com/office/drawing/2010/main" w="9525">
+                <a14:hiddenLine xmlns:a14="http://schemas.microsoft.com/office/drawing/2010/main" xmlns="" w="9525">
                   <a:solidFill>
                     <a:srgbClr val="000000"/>
                   </a:solidFill>
@@ -4043,7 +4127,7 @@
             </a:ln>
             <a:extLst>
               <a:ext uri="{91240B29-F687-4f45-9708-019B960494DF}">
-                <a14:hiddenLine xmlns="" xmlns:a14="http://schemas.microsoft.com/office/drawing/2010/main" w="9525">
+                <a14:hiddenLine xmlns:a14="http://schemas.microsoft.com/office/drawing/2010/main" xmlns="" w="9525">
                   <a:solidFill>
                     <a:srgbClr val="000000"/>
                   </a:solidFill>
@@ -4133,7 +4217,7 @@
             </a:ln>
             <a:extLst>
               <a:ext uri="{91240B29-F687-4f45-9708-019B960494DF}">
-                <a14:hiddenLine xmlns="" xmlns:a14="http://schemas.microsoft.com/office/drawing/2010/main" w="9525">
+                <a14:hiddenLine xmlns:a14="http://schemas.microsoft.com/office/drawing/2010/main" xmlns="" w="9525">
                   <a:solidFill>
                     <a:srgbClr val="000000"/>
                   </a:solidFill>
@@ -4201,7 +4285,7 @@
             </a:ln>
             <a:extLst>
               <a:ext uri="{91240B29-F687-4f45-9708-019B960494DF}">
-                <a14:hiddenLine xmlns="" xmlns:a14="http://schemas.microsoft.com/office/drawing/2010/main" w="9525">
+                <a14:hiddenLine xmlns:a14="http://schemas.microsoft.com/office/drawing/2010/main" xmlns="" w="9525">
                   <a:solidFill>
                     <a:srgbClr val="000000"/>
                   </a:solidFill>
@@ -4263,7 +4347,7 @@
             </a:ln>
             <a:extLst>
               <a:ext uri="{91240B29-F687-4f45-9708-019B960494DF}">
-                <a14:hiddenLine xmlns="" xmlns:a14="http://schemas.microsoft.com/office/drawing/2010/main" w="9525">
+                <a14:hiddenLine xmlns:a14="http://schemas.microsoft.com/office/drawing/2010/main" xmlns="" w="9525">
                   <a:solidFill>
                     <a:srgbClr val="000000"/>
                   </a:solidFill>
@@ -4353,7 +4437,7 @@
             </a:ln>
             <a:extLst>
               <a:ext uri="{91240B29-F687-4f45-9708-019B960494DF}">
-                <a14:hiddenLine xmlns="" xmlns:a14="http://schemas.microsoft.com/office/drawing/2010/main" w="9525">
+                <a14:hiddenLine xmlns:a14="http://schemas.microsoft.com/office/drawing/2010/main" xmlns="" w="9525">
                   <a:solidFill>
                     <a:srgbClr val="000000"/>
                   </a:solidFill>
@@ -4415,7 +4499,7 @@
             </a:ln>
             <a:extLst>
               <a:ext uri="{91240B29-F687-4f45-9708-019B960494DF}">
-                <a14:hiddenLine xmlns="" xmlns:a14="http://schemas.microsoft.com/office/drawing/2010/main" w="9525">
+                <a14:hiddenLine xmlns:a14="http://schemas.microsoft.com/office/drawing/2010/main" xmlns="" w="9525">
                   <a:solidFill>
                     <a:srgbClr val="000000"/>
                   </a:solidFill>
@@ -4505,7 +4589,7 @@
             </a:ln>
             <a:extLst>
               <a:ext uri="{91240B29-F687-4f45-9708-019B960494DF}">
-                <a14:hiddenLine xmlns="" xmlns:a14="http://schemas.microsoft.com/office/drawing/2010/main" w="9525">
+                <a14:hiddenLine xmlns:a14="http://schemas.microsoft.com/office/drawing/2010/main" xmlns="" w="9525">
                   <a:solidFill>
                     <a:srgbClr val="000000"/>
                   </a:solidFill>
@@ -4567,7 +4651,7 @@
             </a:ln>
             <a:extLst>
               <a:ext uri="{91240B29-F687-4f45-9708-019B960494DF}">
-                <a14:hiddenLine xmlns="" xmlns:a14="http://schemas.microsoft.com/office/drawing/2010/main" w="9525">
+                <a14:hiddenLine xmlns:a14="http://schemas.microsoft.com/office/drawing/2010/main" xmlns="" w="9525">
                   <a:solidFill>
                     <a:srgbClr val="000000"/>
                   </a:solidFill>
@@ -4657,7 +4741,7 @@
             </a:ln>
             <a:extLst>
               <a:ext uri="{91240B29-F687-4f45-9708-019B960494DF}">
-                <a14:hiddenLine xmlns="" xmlns:a14="http://schemas.microsoft.com/office/drawing/2010/main" w="9525">
+                <a14:hiddenLine xmlns:a14="http://schemas.microsoft.com/office/drawing/2010/main" xmlns="" w="9525">
                   <a:solidFill>
                     <a:srgbClr val="000000"/>
                   </a:solidFill>
@@ -4691,7 +4775,7 @@
             </a:ln>
             <a:extLst>
               <a:ext uri="{91240B29-F687-4f45-9708-019B960494DF}">
-                <a14:hiddenLine xmlns="" xmlns:a14="http://schemas.microsoft.com/office/drawing/2010/main" w="9525">
+                <a14:hiddenLine xmlns:a14="http://schemas.microsoft.com/office/drawing/2010/main" xmlns="" w="9525">
                   <a:solidFill>
                     <a:srgbClr val="000000"/>
                   </a:solidFill>
@@ -4756,7 +4840,7 @@
             </a:ln>
             <a:extLst>
               <a:ext uri="{91240B29-F687-4f45-9708-019B960494DF}">
-                <a14:hiddenLine xmlns="" xmlns:a14="http://schemas.microsoft.com/office/drawing/2010/main" w="9525">
+                <a14:hiddenLine xmlns:a14="http://schemas.microsoft.com/office/drawing/2010/main" xmlns="" w="9525">
                   <a:solidFill>
                     <a:srgbClr val="000000"/>
                   </a:solidFill>
@@ -4846,7 +4930,7 @@
             </a:ln>
             <a:extLst>
               <a:ext uri="{91240B29-F687-4f45-9708-019B960494DF}">
-                <a14:hiddenLine xmlns="" xmlns:a14="http://schemas.microsoft.com/office/drawing/2010/main" w="9525">
+                <a14:hiddenLine xmlns:a14="http://schemas.microsoft.com/office/drawing/2010/main" xmlns="" w="9525">
                   <a:solidFill>
                     <a:srgbClr val="000000"/>
                   </a:solidFill>
@@ -4908,7 +4992,7 @@
             </a:ln>
             <a:extLst>
               <a:ext uri="{91240B29-F687-4f45-9708-019B960494DF}">
-                <a14:hiddenLine xmlns="" xmlns:a14="http://schemas.microsoft.com/office/drawing/2010/main" w="9525">
+                <a14:hiddenLine xmlns:a14="http://schemas.microsoft.com/office/drawing/2010/main" xmlns="" w="9525">
                   <a:solidFill>
                     <a:srgbClr val="000000"/>
                   </a:solidFill>
@@ -4998,7 +5082,7 @@
             </a:ln>
             <a:extLst>
               <a:ext uri="{91240B29-F687-4f45-9708-019B960494DF}">
-                <a14:hiddenLine xmlns="" xmlns:a14="http://schemas.microsoft.com/office/drawing/2010/main" w="9525">
+                <a14:hiddenLine xmlns:a14="http://schemas.microsoft.com/office/drawing/2010/main" xmlns="" w="9525">
                   <a:solidFill>
                     <a:srgbClr val="000000"/>
                   </a:solidFill>
@@ -5088,7 +5172,7 @@
             </a:ln>
             <a:extLst>
               <a:ext uri="{91240B29-F687-4f45-9708-019B960494DF}">
-                <a14:hiddenLine xmlns="" xmlns:a14="http://schemas.microsoft.com/office/drawing/2010/main" w="9525">
+                <a14:hiddenLine xmlns:a14="http://schemas.microsoft.com/office/drawing/2010/main" xmlns="" w="9525">
                   <a:solidFill>
                     <a:srgbClr val="000000"/>
                   </a:solidFill>
@@ -5153,7 +5237,7 @@
             </a:ln>
             <a:extLst>
               <a:ext uri="{91240B29-F687-4f45-9708-019B960494DF}">
-                <a14:hiddenLine xmlns="" xmlns:a14="http://schemas.microsoft.com/office/drawing/2010/main" w="9525">
+                <a14:hiddenLine xmlns:a14="http://schemas.microsoft.com/office/drawing/2010/main" xmlns="" w="9525">
                   <a:solidFill>
                     <a:srgbClr val="000000"/>
                   </a:solidFill>
@@ -5215,7 +5299,7 @@
             </a:ln>
             <a:extLst>
               <a:ext uri="{91240B29-F687-4f45-9708-019B960494DF}">
-                <a14:hiddenLine xmlns="" xmlns:a14="http://schemas.microsoft.com/office/drawing/2010/main" w="9525">
+                <a14:hiddenLine xmlns:a14="http://schemas.microsoft.com/office/drawing/2010/main" xmlns="" w="9525">
                   <a:solidFill>
                     <a:srgbClr val="000000"/>
                   </a:solidFill>
@@ -5305,7 +5389,7 @@
             </a:ln>
             <a:extLst>
               <a:ext uri="{91240B29-F687-4f45-9708-019B960494DF}">
-                <a14:hiddenLine xmlns="" xmlns:a14="http://schemas.microsoft.com/office/drawing/2010/main" w="9525">
+                <a14:hiddenLine xmlns:a14="http://schemas.microsoft.com/office/drawing/2010/main" xmlns="" w="9525">
                   <a:solidFill>
                     <a:srgbClr val="000000"/>
                   </a:solidFill>
@@ -5395,7 +5479,7 @@
             </a:ln>
             <a:extLst>
               <a:ext uri="{91240B29-F687-4f45-9708-019B960494DF}">
-                <a14:hiddenLine xmlns="" xmlns:a14="http://schemas.microsoft.com/office/drawing/2010/main" w="9525">
+                <a14:hiddenLine xmlns:a14="http://schemas.microsoft.com/office/drawing/2010/main" xmlns="" w="9525">
                   <a:solidFill>
                     <a:srgbClr val="000000"/>
                   </a:solidFill>
@@ -5457,7 +5541,7 @@
             </a:ln>
             <a:extLst>
               <a:ext uri="{91240B29-F687-4f45-9708-019B960494DF}">
-                <a14:hiddenLine xmlns="" xmlns:a14="http://schemas.microsoft.com/office/drawing/2010/main" w="9525">
+                <a14:hiddenLine xmlns:a14="http://schemas.microsoft.com/office/drawing/2010/main" xmlns="" w="9525">
                   <a:solidFill>
                     <a:srgbClr val="000000"/>
                   </a:solidFill>
@@ -5577,7 +5661,7 @@
             </a:ln>
             <a:extLst>
               <a:ext uri="{91240B29-F687-4f45-9708-019B960494DF}">
-                <a14:hiddenLine xmlns="" xmlns:a14="http://schemas.microsoft.com/office/drawing/2010/main" w="9525">
+                <a14:hiddenLine xmlns:a14="http://schemas.microsoft.com/office/drawing/2010/main" xmlns="" w="9525">
                   <a:solidFill>
                     <a:srgbClr val="000000"/>
                   </a:solidFill>
@@ -5645,7 +5729,7 @@
             </a:ln>
             <a:extLst>
               <a:ext uri="{91240B29-F687-4f45-9708-019B960494DF}">
-                <a14:hiddenLine xmlns="" xmlns:a14="http://schemas.microsoft.com/office/drawing/2010/main" w="9525">
+                <a14:hiddenLine xmlns:a14="http://schemas.microsoft.com/office/drawing/2010/main" xmlns="" w="9525">
                   <a:solidFill>
                     <a:srgbClr val="000000"/>
                   </a:solidFill>
@@ -5735,7 +5819,7 @@
             </a:ln>
             <a:extLst>
               <a:ext uri="{91240B29-F687-4f45-9708-019B960494DF}">
-                <a14:hiddenLine xmlns="" xmlns:a14="http://schemas.microsoft.com/office/drawing/2010/main" w="9525">
+                <a14:hiddenLine xmlns:a14="http://schemas.microsoft.com/office/drawing/2010/main" xmlns="" w="9525">
                   <a:solidFill>
                     <a:srgbClr val="000000"/>
                   </a:solidFill>
@@ -5875,7 +5959,7 @@
           <a:p>
             <a:fld id="{071F4C33-94A3-4D29-AE8D-33950698FF4C}" type="datetimeFigureOut">
               <a:rPr lang="en-US" smtClean="0"/>
-              <a:t>10/17/2016</a:t>
+              <a:t>10/18/2016</a:t>
             </a:fld>
             <a:endParaRPr lang="en-US"/>
           </a:p>
@@ -6142,7 +6226,7 @@
           <a:p>
             <a:fld id="{071F4C33-94A3-4D29-AE8D-33950698FF4C}" type="datetimeFigureOut">
               <a:rPr lang="en-US" smtClean="0"/>
-              <a:t>10/17/2016</a:t>
+              <a:t>10/18/2016</a:t>
             </a:fld>
             <a:endParaRPr lang="en-US"/>
           </a:p>
@@ -6338,7 +6422,7 @@
           <a:p>
             <a:fld id="{071F4C33-94A3-4D29-AE8D-33950698FF4C}" type="datetimeFigureOut">
               <a:rPr lang="en-US" smtClean="0"/>
-              <a:t>10/17/2016</a:t>
+              <a:t>10/18/2016</a:t>
             </a:fld>
             <a:endParaRPr lang="en-US"/>
           </a:p>
@@ -6601,7 +6685,7 @@
           <a:p>
             <a:fld id="{071F4C33-94A3-4D29-AE8D-33950698FF4C}" type="datetimeFigureOut">
               <a:rPr lang="en-US" smtClean="0"/>
-              <a:t>10/17/2016</a:t>
+              <a:t>10/18/2016</a:t>
             </a:fld>
             <a:endParaRPr lang="en-US"/>
           </a:p>
@@ -7035,7 +7119,7 @@
           <a:p>
             <a:fld id="{071F4C33-94A3-4D29-AE8D-33950698FF4C}" type="datetimeFigureOut">
               <a:rPr lang="en-US" smtClean="0"/>
-              <a:t>10/17/2016</a:t>
+              <a:t>10/18/2016</a:t>
             </a:fld>
             <a:endParaRPr lang="en-US"/>
           </a:p>
@@ -7581,7 +7665,7 @@
           <a:p>
             <a:fld id="{071F4C33-94A3-4D29-AE8D-33950698FF4C}" type="datetimeFigureOut">
               <a:rPr lang="en-US" smtClean="0"/>
-              <a:t>10/17/2016</a:t>
+              <a:t>10/18/2016</a:t>
             </a:fld>
             <a:endParaRPr lang="en-US"/>
           </a:p>
@@ -8301,7 +8385,7 @@
           <a:p>
             <a:fld id="{071F4C33-94A3-4D29-AE8D-33950698FF4C}" type="datetimeFigureOut">
               <a:rPr lang="en-US" smtClean="0"/>
-              <a:t>10/17/2016</a:t>
+              <a:t>10/18/2016</a:t>
             </a:fld>
             <a:endParaRPr lang="en-US"/>
           </a:p>
@@ -8471,7 +8555,7 @@
           <a:p>
             <a:fld id="{071F4C33-94A3-4D29-AE8D-33950698FF4C}" type="datetimeFigureOut">
               <a:rPr lang="en-US" smtClean="0"/>
-              <a:t>10/17/2016</a:t>
+              <a:t>10/18/2016</a:t>
             </a:fld>
             <a:endParaRPr lang="en-US"/>
           </a:p>
@@ -8651,7 +8735,7 @@
           <a:p>
             <a:fld id="{071F4C33-94A3-4D29-AE8D-33950698FF4C}" type="datetimeFigureOut">
               <a:rPr lang="en-US" smtClean="0"/>
-              <a:t>10/17/2016</a:t>
+              <a:t>10/18/2016</a:t>
             </a:fld>
             <a:endParaRPr lang="en-US"/>
           </a:p>
@@ -8821,7 +8905,7 @@
           <a:p>
             <a:fld id="{071F4C33-94A3-4D29-AE8D-33950698FF4C}" type="datetimeFigureOut">
               <a:rPr lang="en-US" smtClean="0"/>
-              <a:t>10/17/2016</a:t>
+              <a:t>10/18/2016</a:t>
             </a:fld>
             <a:endParaRPr lang="en-US"/>
           </a:p>
@@ -9071,7 +9155,7 @@
           <a:p>
             <a:fld id="{071F4C33-94A3-4D29-AE8D-33950698FF4C}" type="datetimeFigureOut">
               <a:rPr lang="en-US" smtClean="0"/>
-              <a:t>10/17/2016</a:t>
+              <a:t>10/18/2016</a:t>
             </a:fld>
             <a:endParaRPr lang="en-US"/>
           </a:p>
@@ -9303,7 +9387,7 @@
           <a:p>
             <a:fld id="{071F4C33-94A3-4D29-AE8D-33950698FF4C}" type="datetimeFigureOut">
               <a:rPr lang="en-US" smtClean="0"/>
-              <a:t>10/17/2016</a:t>
+              <a:t>10/18/2016</a:t>
             </a:fld>
             <a:endParaRPr lang="en-US"/>
           </a:p>
@@ -9684,7 +9768,7 @@
           <a:p>
             <a:fld id="{071F4C33-94A3-4D29-AE8D-33950698FF4C}" type="datetimeFigureOut">
               <a:rPr lang="en-US" smtClean="0"/>
-              <a:t>10/17/2016</a:t>
+              <a:t>10/18/2016</a:t>
             </a:fld>
             <a:endParaRPr lang="en-US"/>
           </a:p>
@@ -9802,7 +9886,7 @@
           <a:p>
             <a:fld id="{071F4C33-94A3-4D29-AE8D-33950698FF4C}" type="datetimeFigureOut">
               <a:rPr lang="en-US" smtClean="0"/>
-              <a:t>10/17/2016</a:t>
+              <a:t>10/18/2016</a:t>
             </a:fld>
             <a:endParaRPr lang="en-US"/>
           </a:p>
@@ -9897,7 +9981,7 @@
           <a:p>
             <a:fld id="{071F4C33-94A3-4D29-AE8D-33950698FF4C}" type="datetimeFigureOut">
               <a:rPr lang="en-US" smtClean="0"/>
-              <a:t>10/17/2016</a:t>
+              <a:t>10/18/2016</a:t>
             </a:fld>
             <a:endParaRPr lang="en-US"/>
           </a:p>
@@ -10146,7 +10230,7 @@
           <a:p>
             <a:fld id="{071F4C33-94A3-4D29-AE8D-33950698FF4C}" type="datetimeFigureOut">
               <a:rPr lang="en-US" smtClean="0"/>
-              <a:t>10/17/2016</a:t>
+              <a:t>10/18/2016</a:t>
             </a:fld>
             <a:endParaRPr lang="en-US"/>
           </a:p>
@@ -10426,7 +10510,7 @@
           <a:p>
             <a:fld id="{071F4C33-94A3-4D29-AE8D-33950698FF4C}" type="datetimeFigureOut">
               <a:rPr lang="en-US" smtClean="0"/>
-              <a:t>10/17/2016</a:t>
+              <a:t>10/18/2016</a:t>
             </a:fld>
             <a:endParaRPr lang="en-US"/>
           </a:p>
@@ -10549,7 +10633,7 @@
           <a:noFill/>
           <a:extLst>
             <a:ext uri="{909E8E84-426E-40dd-AFC4-6F175D3DCCD1}">
-              <a14:hiddenFill xmlns="" xmlns:a14="http://schemas.microsoft.com/office/drawing/2010/main">
+              <a14:hiddenFill xmlns:a14="http://schemas.microsoft.com/office/drawing/2010/main" xmlns="">
                 <a:solidFill>
                   <a:srgbClr val="FFFFFF"/>
                 </a:solidFill>
@@ -10623,7 +10707,7 @@
               </a:ln>
               <a:extLst>
                 <a:ext uri="{91240B29-F687-4f45-9708-019B960494DF}">
-                  <a14:hiddenLine xmlns="" xmlns:a14="http://schemas.microsoft.com/office/drawing/2010/main" w="9525">
+                  <a14:hiddenLine xmlns:a14="http://schemas.microsoft.com/office/drawing/2010/main" xmlns="" w="9525">
                     <a:solidFill>
                       <a:srgbClr val="000000"/>
                     </a:solidFill>
@@ -10713,7 +10797,7 @@
               </a:ln>
               <a:extLst>
                 <a:ext uri="{91240B29-F687-4f45-9708-019B960494DF}">
-                  <a14:hiddenLine xmlns="" xmlns:a14="http://schemas.microsoft.com/office/drawing/2010/main" w="9525">
+                  <a14:hiddenLine xmlns:a14="http://schemas.microsoft.com/office/drawing/2010/main" xmlns="" w="9525">
                     <a:solidFill>
                       <a:srgbClr val="000000"/>
                     </a:solidFill>
@@ -10803,7 +10887,7 @@
               </a:ln>
               <a:extLst>
                 <a:ext uri="{91240B29-F687-4f45-9708-019B960494DF}">
-                  <a14:hiddenLine xmlns="" xmlns:a14="http://schemas.microsoft.com/office/drawing/2010/main" w="9525">
+                  <a14:hiddenLine xmlns:a14="http://schemas.microsoft.com/office/drawing/2010/main" xmlns="" w="9525">
                     <a:solidFill>
                       <a:srgbClr val="000000"/>
                     </a:solidFill>
@@ -10865,7 +10949,7 @@
               </a:ln>
               <a:extLst>
                 <a:ext uri="{91240B29-F687-4f45-9708-019B960494DF}">
-                  <a14:hiddenLine xmlns="" xmlns:a14="http://schemas.microsoft.com/office/drawing/2010/main" w="9525">
+                  <a14:hiddenLine xmlns:a14="http://schemas.microsoft.com/office/drawing/2010/main" xmlns="" w="9525">
                     <a:solidFill>
                       <a:srgbClr val="000000"/>
                     </a:solidFill>
@@ -10955,7 +11039,7 @@
               </a:ln>
               <a:extLst>
                 <a:ext uri="{91240B29-F687-4f45-9708-019B960494DF}">
-                  <a14:hiddenLine xmlns="" xmlns:a14="http://schemas.microsoft.com/office/drawing/2010/main" w="9525">
+                  <a14:hiddenLine xmlns:a14="http://schemas.microsoft.com/office/drawing/2010/main" xmlns="" w="9525">
                     <a:solidFill>
                       <a:srgbClr val="000000"/>
                     </a:solidFill>
@@ -11017,7 +11101,7 @@
               </a:ln>
               <a:extLst>
                 <a:ext uri="{91240B29-F687-4f45-9708-019B960494DF}">
-                  <a14:hiddenLine xmlns="" xmlns:a14="http://schemas.microsoft.com/office/drawing/2010/main" w="9525">
+                  <a14:hiddenLine xmlns:a14="http://schemas.microsoft.com/office/drawing/2010/main" xmlns="" w="9525">
                     <a:solidFill>
                       <a:srgbClr val="000000"/>
                     </a:solidFill>
@@ -11079,7 +11163,7 @@
               </a:ln>
               <a:extLst>
                 <a:ext uri="{91240B29-F687-4f45-9708-019B960494DF}">
-                  <a14:hiddenLine xmlns="" xmlns:a14="http://schemas.microsoft.com/office/drawing/2010/main" w="9525">
+                  <a14:hiddenLine xmlns:a14="http://schemas.microsoft.com/office/drawing/2010/main" xmlns="" w="9525">
                     <a:solidFill>
                       <a:srgbClr val="000000"/>
                     </a:solidFill>
@@ -11169,7 +11253,7 @@
               </a:ln>
               <a:extLst>
                 <a:ext uri="{91240B29-F687-4f45-9708-019B960494DF}">
-                  <a14:hiddenLine xmlns="" xmlns:a14="http://schemas.microsoft.com/office/drawing/2010/main" w="9525">
+                  <a14:hiddenLine xmlns:a14="http://schemas.microsoft.com/office/drawing/2010/main" xmlns="" w="9525">
                     <a:solidFill>
                       <a:srgbClr val="000000"/>
                     </a:solidFill>
@@ -11259,7 +11343,7 @@
               </a:ln>
               <a:extLst>
                 <a:ext uri="{91240B29-F687-4f45-9708-019B960494DF}">
-                  <a14:hiddenLine xmlns="" xmlns:a14="http://schemas.microsoft.com/office/drawing/2010/main" w="9525">
+                  <a14:hiddenLine xmlns:a14="http://schemas.microsoft.com/office/drawing/2010/main" xmlns="" w="9525">
                     <a:solidFill>
                       <a:srgbClr val="000000"/>
                     </a:solidFill>
@@ -11321,7 +11405,7 @@
               </a:ln>
               <a:extLst>
                 <a:ext uri="{91240B29-F687-4f45-9708-019B960494DF}">
-                  <a14:hiddenLine xmlns="" xmlns:a14="http://schemas.microsoft.com/office/drawing/2010/main" w="9525">
+                  <a14:hiddenLine xmlns:a14="http://schemas.microsoft.com/office/drawing/2010/main" xmlns="" w="9525">
                     <a:solidFill>
                       <a:srgbClr val="000000"/>
                     </a:solidFill>
@@ -11431,7 +11515,7 @@
               </a:ln>
               <a:extLst>
                 <a:ext uri="{91240B29-F687-4f45-9708-019B960494DF}">
-                  <a14:hiddenLine xmlns="" xmlns:a14="http://schemas.microsoft.com/office/drawing/2010/main" w="9525">
+                  <a14:hiddenLine xmlns:a14="http://schemas.microsoft.com/office/drawing/2010/main" xmlns="" w="9525">
                     <a:solidFill>
                       <a:srgbClr val="000000"/>
                     </a:solidFill>
@@ -11515,7 +11599,7 @@
               </a:ln>
               <a:extLst>
                 <a:ext uri="{91240B29-F687-4f45-9708-019B960494DF}">
-                  <a14:hiddenLine xmlns="" xmlns:a14="http://schemas.microsoft.com/office/drawing/2010/main" w="9525">
+                  <a14:hiddenLine xmlns:a14="http://schemas.microsoft.com/office/drawing/2010/main" xmlns="" w="9525">
                     <a:solidFill>
                       <a:srgbClr val="000000"/>
                     </a:solidFill>
@@ -11577,7 +11661,7 @@
               </a:ln>
               <a:extLst>
                 <a:ext uri="{91240B29-F687-4f45-9708-019B960494DF}">
-                  <a14:hiddenLine xmlns="" xmlns:a14="http://schemas.microsoft.com/office/drawing/2010/main" w="9525">
+                  <a14:hiddenLine xmlns:a14="http://schemas.microsoft.com/office/drawing/2010/main" xmlns="" w="9525">
                     <a:solidFill>
                       <a:srgbClr val="000000"/>
                     </a:solidFill>
@@ -11639,7 +11723,7 @@
               </a:ln>
               <a:extLst>
                 <a:ext uri="{91240B29-F687-4f45-9708-019B960494DF}">
-                  <a14:hiddenLine xmlns="" xmlns:a14="http://schemas.microsoft.com/office/drawing/2010/main" w="9525">
+                  <a14:hiddenLine xmlns:a14="http://schemas.microsoft.com/office/drawing/2010/main" xmlns="" w="9525">
                     <a:solidFill>
                       <a:srgbClr val="000000"/>
                     </a:solidFill>
@@ -11729,7 +11813,7 @@
               </a:ln>
               <a:extLst>
                 <a:ext uri="{91240B29-F687-4f45-9708-019B960494DF}">
-                  <a14:hiddenLine xmlns="" xmlns:a14="http://schemas.microsoft.com/office/drawing/2010/main" w="9525">
+                  <a14:hiddenLine xmlns:a14="http://schemas.microsoft.com/office/drawing/2010/main" xmlns="" w="9525">
                     <a:solidFill>
                       <a:srgbClr val="000000"/>
                     </a:solidFill>
@@ -11763,7 +11847,7 @@
               </a:ln>
               <a:extLst>
                 <a:ext uri="{91240B29-F687-4f45-9708-019B960494DF}">
-                  <a14:hiddenLine xmlns="" xmlns:a14="http://schemas.microsoft.com/office/drawing/2010/main" w="9525">
+                  <a14:hiddenLine xmlns:a14="http://schemas.microsoft.com/office/drawing/2010/main" xmlns="" w="9525">
                     <a:solidFill>
                       <a:srgbClr val="000000"/>
                     </a:solidFill>
@@ -11828,7 +11912,7 @@
               </a:ln>
               <a:extLst>
                 <a:ext uri="{91240B29-F687-4f45-9708-019B960494DF}">
-                  <a14:hiddenLine xmlns="" xmlns:a14="http://schemas.microsoft.com/office/drawing/2010/main" w="9525">
+                  <a14:hiddenLine xmlns:a14="http://schemas.microsoft.com/office/drawing/2010/main" xmlns="" w="9525">
                     <a:solidFill>
                       <a:srgbClr val="000000"/>
                     </a:solidFill>
@@ -11918,7 +12002,7 @@
               </a:ln>
               <a:extLst>
                 <a:ext uri="{91240B29-F687-4f45-9708-019B960494DF}">
-                  <a14:hiddenLine xmlns="" xmlns:a14="http://schemas.microsoft.com/office/drawing/2010/main" w="9525">
+                  <a14:hiddenLine xmlns:a14="http://schemas.microsoft.com/office/drawing/2010/main" xmlns="" w="9525">
                     <a:solidFill>
                       <a:srgbClr val="000000"/>
                     </a:solidFill>
@@ -11980,7 +12064,7 @@
               </a:ln>
               <a:extLst>
                 <a:ext uri="{91240B29-F687-4f45-9708-019B960494DF}">
-                  <a14:hiddenLine xmlns="" xmlns:a14="http://schemas.microsoft.com/office/drawing/2010/main" w="9525">
+                  <a14:hiddenLine xmlns:a14="http://schemas.microsoft.com/office/drawing/2010/main" xmlns="" w="9525">
                     <a:solidFill>
                       <a:srgbClr val="000000"/>
                     </a:solidFill>
@@ -12070,7 +12154,7 @@
               </a:ln>
               <a:extLst>
                 <a:ext uri="{91240B29-F687-4f45-9708-019B960494DF}">
-                  <a14:hiddenLine xmlns="" xmlns:a14="http://schemas.microsoft.com/office/drawing/2010/main" w="9525">
+                  <a14:hiddenLine xmlns:a14="http://schemas.microsoft.com/office/drawing/2010/main" xmlns="" w="9525">
                     <a:solidFill>
                       <a:srgbClr val="000000"/>
                     </a:solidFill>
@@ -12135,7 +12219,7 @@
               </a:ln>
               <a:extLst>
                 <a:ext uri="{91240B29-F687-4f45-9708-019B960494DF}">
-                  <a14:hiddenLine xmlns="" xmlns:a14="http://schemas.microsoft.com/office/drawing/2010/main" w="9525">
+                  <a14:hiddenLine xmlns:a14="http://schemas.microsoft.com/office/drawing/2010/main" xmlns="" w="9525">
                     <a:solidFill>
                       <a:srgbClr val="000000"/>
                     </a:solidFill>
@@ -12197,7 +12281,7 @@
               </a:ln>
               <a:extLst>
                 <a:ext uri="{91240B29-F687-4f45-9708-019B960494DF}">
-                  <a14:hiddenLine xmlns="" xmlns:a14="http://schemas.microsoft.com/office/drawing/2010/main" w="9525">
+                  <a14:hiddenLine xmlns:a14="http://schemas.microsoft.com/office/drawing/2010/main" xmlns="" w="9525">
                     <a:solidFill>
                       <a:srgbClr val="000000"/>
                     </a:solidFill>
@@ -12287,7 +12371,7 @@
               </a:ln>
               <a:extLst>
                 <a:ext uri="{91240B29-F687-4f45-9708-019B960494DF}">
-                  <a14:hiddenLine xmlns="" xmlns:a14="http://schemas.microsoft.com/office/drawing/2010/main" w="9525">
+                  <a14:hiddenLine xmlns:a14="http://schemas.microsoft.com/office/drawing/2010/main" xmlns="" w="9525">
                     <a:solidFill>
                       <a:srgbClr val="000000"/>
                     </a:solidFill>
@@ -12377,7 +12461,7 @@
               </a:ln>
               <a:extLst>
                 <a:ext uri="{91240B29-F687-4f45-9708-019B960494DF}">
-                  <a14:hiddenLine xmlns="" xmlns:a14="http://schemas.microsoft.com/office/drawing/2010/main" w="9525">
+                  <a14:hiddenLine xmlns:a14="http://schemas.microsoft.com/office/drawing/2010/main" xmlns="" w="9525">
                     <a:solidFill>
                       <a:srgbClr val="000000"/>
                     </a:solidFill>
@@ -12442,7 +12526,7 @@
               </a:ln>
               <a:extLst>
                 <a:ext uri="{91240B29-F687-4f45-9708-019B960494DF}">
-                  <a14:hiddenLine xmlns="" xmlns:a14="http://schemas.microsoft.com/office/drawing/2010/main" w="9525">
+                  <a14:hiddenLine xmlns:a14="http://schemas.microsoft.com/office/drawing/2010/main" xmlns="" w="9525">
                     <a:solidFill>
                       <a:srgbClr val="000000"/>
                     </a:solidFill>
@@ -12562,7 +12646,7 @@
               </a:ln>
               <a:extLst>
                 <a:ext uri="{91240B29-F687-4f45-9708-019B960494DF}">
-                  <a14:hiddenLine xmlns="" xmlns:a14="http://schemas.microsoft.com/office/drawing/2010/main" w="9525">
+                  <a14:hiddenLine xmlns:a14="http://schemas.microsoft.com/office/drawing/2010/main" xmlns="" w="9525">
                     <a:solidFill>
                       <a:srgbClr val="000000"/>
                     </a:solidFill>
@@ -12643,7 +12727,7 @@
               </a:ln>
               <a:extLst>
                 <a:ext uri="{91240B29-F687-4f45-9708-019B960494DF}">
-                  <a14:hiddenLine xmlns="" xmlns:a14="http://schemas.microsoft.com/office/drawing/2010/main" w="9525">
+                  <a14:hiddenLine xmlns:a14="http://schemas.microsoft.com/office/drawing/2010/main" xmlns="" w="9525">
                     <a:solidFill>
                       <a:srgbClr val="000000"/>
                     </a:solidFill>
@@ -12758,7 +12842,7 @@
               </a:ln>
               <a:extLst>
                 <a:ext uri="{91240B29-F687-4f45-9708-019B960494DF}">
-                  <a14:hiddenLine xmlns="" xmlns:a14="http://schemas.microsoft.com/office/drawing/2010/main" w="9525">
+                  <a14:hiddenLine xmlns:a14="http://schemas.microsoft.com/office/drawing/2010/main" xmlns="" w="9525">
                     <a:solidFill>
                       <a:srgbClr val="000000"/>
                     </a:solidFill>
@@ -12848,7 +12932,7 @@
               </a:ln>
               <a:extLst>
                 <a:ext uri="{91240B29-F687-4f45-9708-019B960494DF}">
-                  <a14:hiddenLine xmlns="" xmlns:a14="http://schemas.microsoft.com/office/drawing/2010/main" w="9525">
+                  <a14:hiddenLine xmlns:a14="http://schemas.microsoft.com/office/drawing/2010/main" xmlns="" w="9525">
                     <a:solidFill>
                       <a:srgbClr val="000000"/>
                     </a:solidFill>
@@ -12913,7 +12997,7 @@
               </a:ln>
               <a:extLst>
                 <a:ext uri="{91240B29-F687-4f45-9708-019B960494DF}">
-                  <a14:hiddenLine xmlns="" xmlns:a14="http://schemas.microsoft.com/office/drawing/2010/main" w="9525">
+                  <a14:hiddenLine xmlns:a14="http://schemas.microsoft.com/office/drawing/2010/main" xmlns="" w="9525">
                     <a:solidFill>
                       <a:srgbClr val="000000"/>
                     </a:solidFill>
@@ -13003,7 +13087,7 @@
               </a:ln>
               <a:extLst>
                 <a:ext uri="{91240B29-F687-4f45-9708-019B960494DF}">
-                  <a14:hiddenLine xmlns="" xmlns:a14="http://schemas.microsoft.com/office/drawing/2010/main" w="9525">
+                  <a14:hiddenLine xmlns:a14="http://schemas.microsoft.com/office/drawing/2010/main" xmlns="" w="9525">
                     <a:solidFill>
                       <a:srgbClr val="000000"/>
                     </a:solidFill>
@@ -13071,7 +13155,7 @@
               </a:ln>
               <a:extLst>
                 <a:ext uri="{91240B29-F687-4f45-9708-019B960494DF}">
-                  <a14:hiddenLine xmlns="" xmlns:a14="http://schemas.microsoft.com/office/drawing/2010/main" w="9525">
+                  <a14:hiddenLine xmlns:a14="http://schemas.microsoft.com/office/drawing/2010/main" xmlns="" w="9525">
                     <a:solidFill>
                       <a:srgbClr val="000000"/>
                     </a:solidFill>
@@ -13161,7 +13245,7 @@
               </a:ln>
               <a:extLst>
                 <a:ext uri="{91240B29-F687-4f45-9708-019B960494DF}">
-                  <a14:hiddenLine xmlns="" xmlns:a14="http://schemas.microsoft.com/office/drawing/2010/main" w="9525">
+                  <a14:hiddenLine xmlns:a14="http://schemas.microsoft.com/office/drawing/2010/main" xmlns="" w="9525">
                     <a:solidFill>
                       <a:srgbClr val="000000"/>
                     </a:solidFill>
@@ -13229,7 +13313,7 @@
               </a:ln>
               <a:extLst>
                 <a:ext uri="{91240B29-F687-4f45-9708-019B960494DF}">
-                  <a14:hiddenLine xmlns="" xmlns:a14="http://schemas.microsoft.com/office/drawing/2010/main" w="9525">
+                  <a14:hiddenLine xmlns:a14="http://schemas.microsoft.com/office/drawing/2010/main" xmlns="" w="9525">
                     <a:solidFill>
                       <a:srgbClr val="000000"/>
                     </a:solidFill>
@@ -13319,7 +13403,7 @@
               </a:ln>
               <a:extLst>
                 <a:ext uri="{91240B29-F687-4f45-9708-019B960494DF}">
-                  <a14:hiddenLine xmlns="" xmlns:a14="http://schemas.microsoft.com/office/drawing/2010/main" w="9525">
+                  <a14:hiddenLine xmlns:a14="http://schemas.microsoft.com/office/drawing/2010/main" xmlns="" w="9525">
                     <a:solidFill>
                       <a:srgbClr val="000000"/>
                     </a:solidFill>
@@ -13353,7 +13437,7 @@
               </a:ln>
               <a:extLst>
                 <a:ext uri="{91240B29-F687-4f45-9708-019B960494DF}">
-                  <a14:hiddenLine xmlns="" xmlns:a14="http://schemas.microsoft.com/office/drawing/2010/main" w="9525">
+                  <a14:hiddenLine xmlns:a14="http://schemas.microsoft.com/office/drawing/2010/main" xmlns="" w="9525">
                     <a:solidFill>
                       <a:srgbClr val="000000"/>
                     </a:solidFill>
@@ -13493,7 +13577,7 @@
           <a:p>
             <a:fld id="{071F4C33-94A3-4D29-AE8D-33950698FF4C}" type="datetimeFigureOut">
               <a:rPr lang="en-US" smtClean="0"/>
-              <a:t>10/17/2016</a:t>
+              <a:t>10/18/2016</a:t>
             </a:fld>
             <a:endParaRPr lang="en-US"/>
           </a:p>
@@ -17564,22 +17648,22 @@
       </p:sp>
       <p:pic>
         <p:nvPicPr>
-          <p:cNvPr id="5" name="Content Placeholder 4"/>
+          <p:cNvPr id="3" name="Picture 2"/>
           <p:cNvPicPr>
-            <a:picLocks/>
+            <a:picLocks noChangeAspect="1"/>
           </p:cNvPicPr>
           <p:nvPr/>
         </p:nvPicPr>
         <p:blipFill>
-          <a:blip r:embed="rId2"/>
+          <a:blip r:embed="rId3"/>
           <a:stretch>
             <a:fillRect/>
           </a:stretch>
         </p:blipFill>
         <p:spPr>
           <a:xfrm>
-            <a:off x="5891645" y="758536"/>
-            <a:ext cx="5735783" cy="5437909"/>
+            <a:off x="5777345" y="1001531"/>
+            <a:ext cx="5725783" cy="5045978"/>
           </a:xfrm>
           <a:prstGeom prst="rect">
             <a:avLst/>

</xml_diff>

<commit_message>
Updates to final Phase 2.
</commit_message>
<xml_diff>
--- a/Documents/Phase 2/Phase 2 Presentation.pptx
+++ b/Documents/Phase 2/Phase 2 Presentation.pptx
@@ -532,7 +532,7 @@
           <a:bodyPr/>
           <a:lstStyle/>
           <a:p>
-            <a:endParaRPr lang="en-US"/>
+            <a:endParaRPr lang="en-US" dirty="0"/>
           </a:p>
         </p:txBody>
       </p:sp>
@@ -616,144 +616,7 @@
           <a:bodyPr/>
           <a:lstStyle/>
           <a:p>
-            <a:r>
-              <a:rPr lang="en-US" dirty="0"/>
-              <a:t>Management:</a:t>
-            </a:r>
-          </a:p>
-          <a:p>
-            <a:r>
-              <a:rPr lang="en-US" dirty="0"/>
-              <a:t>	You</a:t>
-            </a:r>
-            <a:r>
-              <a:rPr lang="en-US" baseline="0" dirty="0"/>
-              <a:t> all are the Supervisory Committee with Dr. </a:t>
-            </a:r>
-            <a:r>
-              <a:rPr lang="en-US" baseline="0" dirty="0" err="1"/>
-              <a:t>Neilsen</a:t>
-            </a:r>
-            <a:r>
-              <a:rPr lang="en-US" baseline="0" dirty="0"/>
-              <a:t> being the Major Professor</a:t>
-            </a:r>
-          </a:p>
-          <a:p>
             <a:endParaRPr lang="en-US" baseline="0" dirty="0"/>
-          </a:p>
-          <a:p>
-            <a:r>
-              <a:rPr lang="en-US" baseline="0" dirty="0"/>
-              <a:t>	Technical Inspectors: Tracy Marshall and Keith Moyer</a:t>
-            </a:r>
-          </a:p>
-          <a:p>
-            <a:endParaRPr lang="en-US" baseline="0" dirty="0"/>
-          </a:p>
-          <a:p>
-            <a:endParaRPr lang="en-US" baseline="0" dirty="0"/>
-          </a:p>
-          <a:p>
-            <a:r>
-              <a:rPr lang="en-US" baseline="0" dirty="0"/>
-              <a:t>Software Reviews:</a:t>
-            </a:r>
-          </a:p>
-          <a:p>
-            <a:r>
-              <a:rPr lang="en-US" baseline="0" dirty="0"/>
-              <a:t>	This will come in the form of these presentations along with the technical inspections done.</a:t>
-            </a:r>
-          </a:p>
-          <a:p>
-            <a:endParaRPr lang="en-US" baseline="0" dirty="0"/>
-          </a:p>
-          <a:p>
-            <a:endParaRPr lang="en-US" baseline="0" dirty="0"/>
-          </a:p>
-          <a:p>
-            <a:r>
-              <a:rPr lang="en-US" baseline="0" dirty="0"/>
-              <a:t>Testing:</a:t>
-            </a:r>
-          </a:p>
-          <a:p>
-            <a:r>
-              <a:rPr lang="en-US" baseline="0" dirty="0"/>
-              <a:t>	A detailed test plan will be given during the second phase of the project, which will assess the critical requirements.</a:t>
-            </a:r>
-          </a:p>
-          <a:p>
-            <a:endParaRPr lang="en-US" baseline="0" dirty="0"/>
-          </a:p>
-          <a:p>
-            <a:endParaRPr lang="en-US" baseline="0" dirty="0"/>
-          </a:p>
-          <a:p>
-            <a:r>
-              <a:rPr lang="en-US" baseline="0" dirty="0"/>
-              <a:t>Problem Reporting and Corrective Action:</a:t>
-            </a:r>
-          </a:p>
-          <a:p>
-            <a:r>
-              <a:rPr lang="en-US" baseline="0" dirty="0"/>
-              <a:t>	Any issues reported by the committee or the technical inspectors will be reported and any needed corrective action will take place.  Depending on the issue type, it can be noted and documented through the documentation in latter phases or through the GitHub Issue reporting system.</a:t>
-            </a:r>
-          </a:p>
-          <a:p>
-            <a:endParaRPr lang="en-US" baseline="0" dirty="0"/>
-          </a:p>
-          <a:p>
-            <a:endParaRPr lang="en-US" baseline="0" dirty="0"/>
-          </a:p>
-          <a:p>
-            <a:r>
-              <a:rPr lang="en-US" baseline="0" dirty="0"/>
-              <a:t>Tools, Techniques and Methodologies:</a:t>
-            </a:r>
-          </a:p>
-          <a:p>
-            <a:r>
-              <a:rPr lang="en-US" baseline="0" dirty="0"/>
-              <a:t>	Visual Studio IDE – Currently Python 3.5 (possibly switching to 2.7 due to TCP/IP libraries)</a:t>
-            </a:r>
-          </a:p>
-          <a:p>
-            <a:r>
-              <a:rPr lang="en-US" baseline="0" dirty="0"/>
-              <a:t>	Documentation is through Microsoft Office 365 Suite of tools</a:t>
-            </a:r>
-          </a:p>
-          <a:p>
-            <a:r>
-              <a:rPr lang="en-US" baseline="0" dirty="0"/>
-              <a:t>	UML Diagrams through Visual Paradigm</a:t>
-            </a:r>
-          </a:p>
-          <a:p>
-            <a:endParaRPr lang="en-US" baseline="0" dirty="0"/>
-          </a:p>
-          <a:p>
-            <a:r>
-              <a:rPr lang="en-US" baseline="0" dirty="0"/>
-              <a:t>Revision Control:</a:t>
-            </a:r>
-          </a:p>
-          <a:p>
-            <a:r>
-              <a:rPr lang="en-US" baseline="0" dirty="0"/>
-              <a:t>	</a:t>
-            </a:r>
-            <a:r>
-              <a:rPr lang="en-US" baseline="0" dirty="0" err="1"/>
-              <a:t>Git</a:t>
-            </a:r>
-            <a:r>
-              <a:rPr lang="en-US" baseline="0" dirty="0"/>
-              <a:t> via GitHub</a:t>
-            </a:r>
           </a:p>
         </p:txBody>
       </p:sp>
@@ -837,144 +700,7 @@
           <a:bodyPr/>
           <a:lstStyle/>
           <a:p>
-            <a:r>
-              <a:rPr lang="en-US" dirty="0"/>
-              <a:t>Management:</a:t>
-            </a:r>
-          </a:p>
-          <a:p>
-            <a:r>
-              <a:rPr lang="en-US" dirty="0"/>
-              <a:t>	You</a:t>
-            </a:r>
-            <a:r>
-              <a:rPr lang="en-US" baseline="0" dirty="0"/>
-              <a:t> all are the Supervisory Committee with Dr. </a:t>
-            </a:r>
-            <a:r>
-              <a:rPr lang="en-US" baseline="0" dirty="0" err="1"/>
-              <a:t>Neilsen</a:t>
-            </a:r>
-            <a:r>
-              <a:rPr lang="en-US" baseline="0" dirty="0"/>
-              <a:t> being the Major Professor</a:t>
-            </a:r>
-          </a:p>
-          <a:p>
             <a:endParaRPr lang="en-US" baseline="0" dirty="0"/>
-          </a:p>
-          <a:p>
-            <a:r>
-              <a:rPr lang="en-US" baseline="0" dirty="0"/>
-              <a:t>	Technical Inspectors: Tracy Marshall and Keith Moyer</a:t>
-            </a:r>
-          </a:p>
-          <a:p>
-            <a:endParaRPr lang="en-US" baseline="0" dirty="0"/>
-          </a:p>
-          <a:p>
-            <a:endParaRPr lang="en-US" baseline="0" dirty="0"/>
-          </a:p>
-          <a:p>
-            <a:r>
-              <a:rPr lang="en-US" baseline="0" dirty="0"/>
-              <a:t>Software Reviews:</a:t>
-            </a:r>
-          </a:p>
-          <a:p>
-            <a:r>
-              <a:rPr lang="en-US" baseline="0" dirty="0"/>
-              <a:t>	This will come in the form of these presentations along with the technical inspections done.</a:t>
-            </a:r>
-          </a:p>
-          <a:p>
-            <a:endParaRPr lang="en-US" baseline="0" dirty="0"/>
-          </a:p>
-          <a:p>
-            <a:endParaRPr lang="en-US" baseline="0" dirty="0"/>
-          </a:p>
-          <a:p>
-            <a:r>
-              <a:rPr lang="en-US" baseline="0" dirty="0"/>
-              <a:t>Testing:</a:t>
-            </a:r>
-          </a:p>
-          <a:p>
-            <a:r>
-              <a:rPr lang="en-US" baseline="0" dirty="0"/>
-              <a:t>	A detailed test plan will be given during the second phase of the project, which will assess the critical requirements.</a:t>
-            </a:r>
-          </a:p>
-          <a:p>
-            <a:endParaRPr lang="en-US" baseline="0" dirty="0"/>
-          </a:p>
-          <a:p>
-            <a:endParaRPr lang="en-US" baseline="0" dirty="0"/>
-          </a:p>
-          <a:p>
-            <a:r>
-              <a:rPr lang="en-US" baseline="0" dirty="0"/>
-              <a:t>Problem Reporting and Corrective Action:</a:t>
-            </a:r>
-          </a:p>
-          <a:p>
-            <a:r>
-              <a:rPr lang="en-US" baseline="0" dirty="0"/>
-              <a:t>	Any issues reported by the committee or the technical inspectors will be reported and any needed corrective action will take place.  Depending on the issue type, it can be noted and documented through the documentation in latter phases or through the GitHub Issue reporting system.</a:t>
-            </a:r>
-          </a:p>
-          <a:p>
-            <a:endParaRPr lang="en-US" baseline="0" dirty="0"/>
-          </a:p>
-          <a:p>
-            <a:endParaRPr lang="en-US" baseline="0" dirty="0"/>
-          </a:p>
-          <a:p>
-            <a:r>
-              <a:rPr lang="en-US" baseline="0" dirty="0"/>
-              <a:t>Tools, Techniques and Methodologies:</a:t>
-            </a:r>
-          </a:p>
-          <a:p>
-            <a:r>
-              <a:rPr lang="en-US" baseline="0" dirty="0"/>
-              <a:t>	Visual Studio IDE – Currently Python 3.5 (possibly switching to 2.7 due to TCP/IP libraries)</a:t>
-            </a:r>
-          </a:p>
-          <a:p>
-            <a:r>
-              <a:rPr lang="en-US" baseline="0" dirty="0"/>
-              <a:t>	Documentation is through Microsoft Office 365 Suite of tools</a:t>
-            </a:r>
-          </a:p>
-          <a:p>
-            <a:r>
-              <a:rPr lang="en-US" baseline="0" dirty="0"/>
-              <a:t>	UML Diagrams through Visual Paradigm</a:t>
-            </a:r>
-          </a:p>
-          <a:p>
-            <a:endParaRPr lang="en-US" baseline="0" dirty="0"/>
-          </a:p>
-          <a:p>
-            <a:r>
-              <a:rPr lang="en-US" baseline="0" dirty="0"/>
-              <a:t>Revision Control:</a:t>
-            </a:r>
-          </a:p>
-          <a:p>
-            <a:r>
-              <a:rPr lang="en-US" baseline="0" dirty="0"/>
-              <a:t>	</a:t>
-            </a:r>
-            <a:r>
-              <a:rPr lang="en-US" baseline="0" dirty="0" err="1"/>
-              <a:t>Git</a:t>
-            </a:r>
-            <a:r>
-              <a:rPr lang="en-US" baseline="0" dirty="0"/>
-              <a:t> via GitHub</a:t>
-            </a:r>
           </a:p>
         </p:txBody>
       </p:sp>
@@ -1058,144 +784,7 @@
           <a:bodyPr/>
           <a:lstStyle/>
           <a:p>
-            <a:r>
-              <a:rPr lang="en-US" dirty="0"/>
-              <a:t>Management:</a:t>
-            </a:r>
-          </a:p>
-          <a:p>
-            <a:r>
-              <a:rPr lang="en-US" dirty="0"/>
-              <a:t>	You</a:t>
-            </a:r>
-            <a:r>
-              <a:rPr lang="en-US" baseline="0" dirty="0"/>
-              <a:t> all are the Supervisory Committee with Dr. </a:t>
-            </a:r>
-            <a:r>
-              <a:rPr lang="en-US" baseline="0" dirty="0" err="1"/>
-              <a:t>Neilsen</a:t>
-            </a:r>
-            <a:r>
-              <a:rPr lang="en-US" baseline="0" dirty="0"/>
-              <a:t> being the Major Professor</a:t>
-            </a:r>
-          </a:p>
-          <a:p>
             <a:endParaRPr lang="en-US" baseline="0" dirty="0"/>
-          </a:p>
-          <a:p>
-            <a:r>
-              <a:rPr lang="en-US" baseline="0" dirty="0"/>
-              <a:t>	Technical Inspectors: Tracy Marshall and Keith Moyer</a:t>
-            </a:r>
-          </a:p>
-          <a:p>
-            <a:endParaRPr lang="en-US" baseline="0" dirty="0"/>
-          </a:p>
-          <a:p>
-            <a:endParaRPr lang="en-US" baseline="0" dirty="0"/>
-          </a:p>
-          <a:p>
-            <a:r>
-              <a:rPr lang="en-US" baseline="0" dirty="0"/>
-              <a:t>Software Reviews:</a:t>
-            </a:r>
-          </a:p>
-          <a:p>
-            <a:r>
-              <a:rPr lang="en-US" baseline="0" dirty="0"/>
-              <a:t>	This will come in the form of these presentations along with the technical inspections done.</a:t>
-            </a:r>
-          </a:p>
-          <a:p>
-            <a:endParaRPr lang="en-US" baseline="0" dirty="0"/>
-          </a:p>
-          <a:p>
-            <a:endParaRPr lang="en-US" baseline="0" dirty="0"/>
-          </a:p>
-          <a:p>
-            <a:r>
-              <a:rPr lang="en-US" baseline="0" dirty="0"/>
-              <a:t>Testing:</a:t>
-            </a:r>
-          </a:p>
-          <a:p>
-            <a:r>
-              <a:rPr lang="en-US" baseline="0" dirty="0"/>
-              <a:t>	A detailed test plan will be given during the second phase of the project, which will assess the critical requirements.</a:t>
-            </a:r>
-          </a:p>
-          <a:p>
-            <a:endParaRPr lang="en-US" baseline="0" dirty="0"/>
-          </a:p>
-          <a:p>
-            <a:endParaRPr lang="en-US" baseline="0" dirty="0"/>
-          </a:p>
-          <a:p>
-            <a:r>
-              <a:rPr lang="en-US" baseline="0" dirty="0"/>
-              <a:t>Problem Reporting and Corrective Action:</a:t>
-            </a:r>
-          </a:p>
-          <a:p>
-            <a:r>
-              <a:rPr lang="en-US" baseline="0" dirty="0"/>
-              <a:t>	Any issues reported by the committee or the technical inspectors will be reported and any needed corrective action will take place.  Depending on the issue type, it can be noted and documented through the documentation in latter phases or through the GitHub Issue reporting system.</a:t>
-            </a:r>
-          </a:p>
-          <a:p>
-            <a:endParaRPr lang="en-US" baseline="0" dirty="0"/>
-          </a:p>
-          <a:p>
-            <a:endParaRPr lang="en-US" baseline="0" dirty="0"/>
-          </a:p>
-          <a:p>
-            <a:r>
-              <a:rPr lang="en-US" baseline="0" dirty="0"/>
-              <a:t>Tools, Techniques and Methodologies:</a:t>
-            </a:r>
-          </a:p>
-          <a:p>
-            <a:r>
-              <a:rPr lang="en-US" baseline="0" dirty="0"/>
-              <a:t>	Visual Studio IDE – Currently Python 3.5 (possibly switching to 2.7 due to TCP/IP libraries)</a:t>
-            </a:r>
-          </a:p>
-          <a:p>
-            <a:r>
-              <a:rPr lang="en-US" baseline="0" dirty="0"/>
-              <a:t>	Documentation is through Microsoft Office 365 Suite of tools</a:t>
-            </a:r>
-          </a:p>
-          <a:p>
-            <a:r>
-              <a:rPr lang="en-US" baseline="0" dirty="0"/>
-              <a:t>	UML Diagrams through Visual Paradigm</a:t>
-            </a:r>
-          </a:p>
-          <a:p>
-            <a:endParaRPr lang="en-US" baseline="0" dirty="0"/>
-          </a:p>
-          <a:p>
-            <a:r>
-              <a:rPr lang="en-US" baseline="0" dirty="0"/>
-              <a:t>Revision Control:</a:t>
-            </a:r>
-          </a:p>
-          <a:p>
-            <a:r>
-              <a:rPr lang="en-US" baseline="0" dirty="0"/>
-              <a:t>	</a:t>
-            </a:r>
-            <a:r>
-              <a:rPr lang="en-US" baseline="0" dirty="0" err="1"/>
-              <a:t>Git</a:t>
-            </a:r>
-            <a:r>
-              <a:rPr lang="en-US" baseline="0" dirty="0"/>
-              <a:t> via GitHub</a:t>
-            </a:r>
           </a:p>
         </p:txBody>
       </p:sp>
@@ -1279,144 +868,7 @@
           <a:bodyPr/>
           <a:lstStyle/>
           <a:p>
-            <a:r>
-              <a:rPr lang="en-US" dirty="0"/>
-              <a:t>Management:</a:t>
-            </a:r>
-          </a:p>
-          <a:p>
-            <a:r>
-              <a:rPr lang="en-US" dirty="0"/>
-              <a:t>	You</a:t>
-            </a:r>
-            <a:r>
-              <a:rPr lang="en-US" baseline="0" dirty="0"/>
-              <a:t> all are the Supervisory Committee with Dr. </a:t>
-            </a:r>
-            <a:r>
-              <a:rPr lang="en-US" baseline="0" dirty="0" err="1"/>
-              <a:t>Neilsen</a:t>
-            </a:r>
-            <a:r>
-              <a:rPr lang="en-US" baseline="0" dirty="0"/>
-              <a:t> being the Major Professor</a:t>
-            </a:r>
-          </a:p>
-          <a:p>
             <a:endParaRPr lang="en-US" baseline="0" dirty="0"/>
-          </a:p>
-          <a:p>
-            <a:r>
-              <a:rPr lang="en-US" baseline="0" dirty="0"/>
-              <a:t>	Technical Inspectors: Tracy Marshall and Keith Moyer</a:t>
-            </a:r>
-          </a:p>
-          <a:p>
-            <a:endParaRPr lang="en-US" baseline="0" dirty="0"/>
-          </a:p>
-          <a:p>
-            <a:endParaRPr lang="en-US" baseline="0" dirty="0"/>
-          </a:p>
-          <a:p>
-            <a:r>
-              <a:rPr lang="en-US" baseline="0" dirty="0"/>
-              <a:t>Software Reviews:</a:t>
-            </a:r>
-          </a:p>
-          <a:p>
-            <a:r>
-              <a:rPr lang="en-US" baseline="0" dirty="0"/>
-              <a:t>	This will come in the form of these presentations along with the technical inspections done.</a:t>
-            </a:r>
-          </a:p>
-          <a:p>
-            <a:endParaRPr lang="en-US" baseline="0" dirty="0"/>
-          </a:p>
-          <a:p>
-            <a:endParaRPr lang="en-US" baseline="0" dirty="0"/>
-          </a:p>
-          <a:p>
-            <a:r>
-              <a:rPr lang="en-US" baseline="0" dirty="0"/>
-              <a:t>Testing:</a:t>
-            </a:r>
-          </a:p>
-          <a:p>
-            <a:r>
-              <a:rPr lang="en-US" baseline="0" dirty="0"/>
-              <a:t>	A detailed test plan will be given during the second phase of the project, which will assess the critical requirements.</a:t>
-            </a:r>
-          </a:p>
-          <a:p>
-            <a:endParaRPr lang="en-US" baseline="0" dirty="0"/>
-          </a:p>
-          <a:p>
-            <a:endParaRPr lang="en-US" baseline="0" dirty="0"/>
-          </a:p>
-          <a:p>
-            <a:r>
-              <a:rPr lang="en-US" baseline="0" dirty="0"/>
-              <a:t>Problem Reporting and Corrective Action:</a:t>
-            </a:r>
-          </a:p>
-          <a:p>
-            <a:r>
-              <a:rPr lang="en-US" baseline="0" dirty="0"/>
-              <a:t>	Any issues reported by the committee or the technical inspectors will be reported and any needed corrective action will take place.  Depending on the issue type, it can be noted and documented through the documentation in latter phases or through the GitHub Issue reporting system.</a:t>
-            </a:r>
-          </a:p>
-          <a:p>
-            <a:endParaRPr lang="en-US" baseline="0" dirty="0"/>
-          </a:p>
-          <a:p>
-            <a:endParaRPr lang="en-US" baseline="0" dirty="0"/>
-          </a:p>
-          <a:p>
-            <a:r>
-              <a:rPr lang="en-US" baseline="0" dirty="0"/>
-              <a:t>Tools, Techniques and Methodologies:</a:t>
-            </a:r>
-          </a:p>
-          <a:p>
-            <a:r>
-              <a:rPr lang="en-US" baseline="0" dirty="0"/>
-              <a:t>	Visual Studio IDE – Currently Python 3.5 (possibly switching to 2.7 due to TCP/IP libraries)</a:t>
-            </a:r>
-          </a:p>
-          <a:p>
-            <a:r>
-              <a:rPr lang="en-US" baseline="0" dirty="0"/>
-              <a:t>	Documentation is through Microsoft Office 365 Suite of tools</a:t>
-            </a:r>
-          </a:p>
-          <a:p>
-            <a:r>
-              <a:rPr lang="en-US" baseline="0" dirty="0"/>
-              <a:t>	UML Diagrams through Visual Paradigm</a:t>
-            </a:r>
-          </a:p>
-          <a:p>
-            <a:endParaRPr lang="en-US" baseline="0" dirty="0"/>
-          </a:p>
-          <a:p>
-            <a:r>
-              <a:rPr lang="en-US" baseline="0" dirty="0"/>
-              <a:t>Revision Control:</a:t>
-            </a:r>
-          </a:p>
-          <a:p>
-            <a:r>
-              <a:rPr lang="en-US" baseline="0" dirty="0"/>
-              <a:t>	</a:t>
-            </a:r>
-            <a:r>
-              <a:rPr lang="en-US" baseline="0" dirty="0" err="1"/>
-              <a:t>Git</a:t>
-            </a:r>
-            <a:r>
-              <a:rPr lang="en-US" baseline="0" dirty="0"/>
-              <a:t> via GitHub</a:t>
-            </a:r>
           </a:p>
         </p:txBody>
       </p:sp>
@@ -1500,144 +952,7 @@
           <a:bodyPr/>
           <a:lstStyle/>
           <a:p>
-            <a:r>
-              <a:rPr lang="en-US" dirty="0"/>
-              <a:t>Management:</a:t>
-            </a:r>
-          </a:p>
-          <a:p>
-            <a:r>
-              <a:rPr lang="en-US" dirty="0"/>
-              <a:t>	You</a:t>
-            </a:r>
-            <a:r>
-              <a:rPr lang="en-US" baseline="0" dirty="0"/>
-              <a:t> all are the Supervisory Committee with Dr. </a:t>
-            </a:r>
-            <a:r>
-              <a:rPr lang="en-US" baseline="0" dirty="0" err="1"/>
-              <a:t>Neilsen</a:t>
-            </a:r>
-            <a:r>
-              <a:rPr lang="en-US" baseline="0" dirty="0"/>
-              <a:t> being the Major Professor</a:t>
-            </a:r>
-          </a:p>
-          <a:p>
             <a:endParaRPr lang="en-US" baseline="0" dirty="0"/>
-          </a:p>
-          <a:p>
-            <a:r>
-              <a:rPr lang="en-US" baseline="0" dirty="0"/>
-              <a:t>	Technical Inspectors: Tracy Marshall and Keith Moyer</a:t>
-            </a:r>
-          </a:p>
-          <a:p>
-            <a:endParaRPr lang="en-US" baseline="0" dirty="0"/>
-          </a:p>
-          <a:p>
-            <a:endParaRPr lang="en-US" baseline="0" dirty="0"/>
-          </a:p>
-          <a:p>
-            <a:r>
-              <a:rPr lang="en-US" baseline="0" dirty="0"/>
-              <a:t>Software Reviews:</a:t>
-            </a:r>
-          </a:p>
-          <a:p>
-            <a:r>
-              <a:rPr lang="en-US" baseline="0" dirty="0"/>
-              <a:t>	This will come in the form of these presentations along with the technical inspections done.</a:t>
-            </a:r>
-          </a:p>
-          <a:p>
-            <a:endParaRPr lang="en-US" baseline="0" dirty="0"/>
-          </a:p>
-          <a:p>
-            <a:endParaRPr lang="en-US" baseline="0" dirty="0"/>
-          </a:p>
-          <a:p>
-            <a:r>
-              <a:rPr lang="en-US" baseline="0" dirty="0"/>
-              <a:t>Testing:</a:t>
-            </a:r>
-          </a:p>
-          <a:p>
-            <a:r>
-              <a:rPr lang="en-US" baseline="0" dirty="0"/>
-              <a:t>	A detailed test plan will be given during the second phase of the project, which will assess the critical requirements.</a:t>
-            </a:r>
-          </a:p>
-          <a:p>
-            <a:endParaRPr lang="en-US" baseline="0" dirty="0"/>
-          </a:p>
-          <a:p>
-            <a:endParaRPr lang="en-US" baseline="0" dirty="0"/>
-          </a:p>
-          <a:p>
-            <a:r>
-              <a:rPr lang="en-US" baseline="0" dirty="0"/>
-              <a:t>Problem Reporting and Corrective Action:</a:t>
-            </a:r>
-          </a:p>
-          <a:p>
-            <a:r>
-              <a:rPr lang="en-US" baseline="0" dirty="0"/>
-              <a:t>	Any issues reported by the committee or the technical inspectors will be reported and any needed corrective action will take place.  Depending on the issue type, it can be noted and documented through the documentation in latter phases or through the GitHub Issue reporting system.</a:t>
-            </a:r>
-          </a:p>
-          <a:p>
-            <a:endParaRPr lang="en-US" baseline="0" dirty="0"/>
-          </a:p>
-          <a:p>
-            <a:endParaRPr lang="en-US" baseline="0" dirty="0"/>
-          </a:p>
-          <a:p>
-            <a:r>
-              <a:rPr lang="en-US" baseline="0" dirty="0"/>
-              <a:t>Tools, Techniques and Methodologies:</a:t>
-            </a:r>
-          </a:p>
-          <a:p>
-            <a:r>
-              <a:rPr lang="en-US" baseline="0" dirty="0"/>
-              <a:t>	Visual Studio IDE – Currently Python 3.5 (possibly switching to 2.7 due to TCP/IP libraries)</a:t>
-            </a:r>
-          </a:p>
-          <a:p>
-            <a:r>
-              <a:rPr lang="en-US" baseline="0" dirty="0"/>
-              <a:t>	Documentation is through Microsoft Office 365 Suite of tools</a:t>
-            </a:r>
-          </a:p>
-          <a:p>
-            <a:r>
-              <a:rPr lang="en-US" baseline="0" dirty="0"/>
-              <a:t>	UML Diagrams through Visual Paradigm</a:t>
-            </a:r>
-          </a:p>
-          <a:p>
-            <a:endParaRPr lang="en-US" baseline="0" dirty="0"/>
-          </a:p>
-          <a:p>
-            <a:r>
-              <a:rPr lang="en-US" baseline="0" dirty="0"/>
-              <a:t>Revision Control:</a:t>
-            </a:r>
-          </a:p>
-          <a:p>
-            <a:r>
-              <a:rPr lang="en-US" baseline="0" dirty="0"/>
-              <a:t>	</a:t>
-            </a:r>
-            <a:r>
-              <a:rPr lang="en-US" baseline="0" dirty="0" err="1"/>
-              <a:t>Git</a:t>
-            </a:r>
-            <a:r>
-              <a:rPr lang="en-US" baseline="0" dirty="0"/>
-              <a:t> via GitHub</a:t>
-            </a:r>
           </a:p>
         </p:txBody>
       </p:sp>
@@ -16474,7 +15789,12 @@
             <p:ph idx="1"/>
           </p:nvPr>
         </p:nvSpPr>
-        <p:spPr/>
+        <p:spPr>
+          <a:xfrm>
+            <a:off x="1141412" y="1812022"/>
+            <a:ext cx="9905999" cy="3979179"/>
+          </a:xfrm>
+        </p:spPr>
         <p:txBody>
           <a:bodyPr/>
           <a:lstStyle/>
@@ -17648,7 +16968,7 @@
       </p:sp>
       <p:pic>
         <p:nvPicPr>
-          <p:cNvPr id="3" name="Picture 2"/>
+          <p:cNvPr id="6" name="Picture 5"/>
           <p:cNvPicPr>
             <a:picLocks noChangeAspect="1"/>
           </p:cNvPicPr>
@@ -17662,8 +16982,8 @@
         </p:blipFill>
         <p:spPr>
           <a:xfrm>
-            <a:off x="5777345" y="1001531"/>
-            <a:ext cx="5725783" cy="5045978"/>
+            <a:off x="5697249" y="997528"/>
+            <a:ext cx="6075304" cy="5340927"/>
           </a:xfrm>
           <a:prstGeom prst="rect">
             <a:avLst/>

</xml_diff>